<commit_message>
new arch diagram, author name for hackflight
</commit_message>
<xml_diff>
--- a/docs/paper/figures.pptx
+++ b/docs/paper/figures.pptx
@@ -6,7 +6,8 @@
   </p:sldMasterIdLst>
   <p:sldIdLst>
     <p:sldId id="256" r:id="rId2"/>
-    <p:sldId id="257" r:id="rId3"/>
+    <p:sldId id="259" r:id="rId3"/>
+    <p:sldId id="257" r:id="rId4"/>
   </p:sldIdLst>
   <p:sldSz cx="12192000" cy="6858000"/>
   <p:notesSz cx="6858000" cy="9144000"/>
@@ -105,7 +106,16 @@
       </a:defRPr>
     </a:lvl9pPr>
   </p:defaultTextStyle>
+  <p:extLst>
+    <p:ext uri="{EFAFB233-063F-42B5-8137-9DF3F51BA10A}">
+      <p15:sldGuideLst xmlns:p15="http://schemas.microsoft.com/office/powerpoint/2012/main"/>
+    </p:ext>
+  </p:extLst>
 </p:presentation>
+</file>
+
+<file path=ppt/revisionInfo.xml><?xml version="1.0" encoding="utf-8"?>
+<p1510:revInfo xmlns:a="http://schemas.openxmlformats.org/drawingml/2006/main" xmlns:r="http://schemas.openxmlformats.org/officeDocument/2006/relationships" xmlns:p1510="http://schemas.microsoft.com/office/powerpoint/2015/10/main"/>
 </file>
 
 <file path=ppt/slideLayouts/slideLayout1.xml><?xml version="1.0" encoding="utf-8"?>
@@ -150,10 +160,9 @@
           </a:lstStyle>
           <a:p>
             <a:r>
-              <a:rPr lang="en-US" smtClean="0"/>
+              <a:rPr lang="en-US"/>
               <a:t>Click to edit Master title style</a:t>
             </a:r>
-            <a:endParaRPr lang="en-US"/>
           </a:p>
         </p:txBody>
       </p:sp>
@@ -215,10 +224,9 @@
           </a:lstStyle>
           <a:p>
             <a:r>
-              <a:rPr lang="en-US" smtClean="0"/>
+              <a:rPr lang="en-US"/>
               <a:t>Click to edit Master subtitle style</a:t>
             </a:r>
-            <a:endParaRPr lang="en-US"/>
           </a:p>
         </p:txBody>
       </p:sp>
@@ -239,7 +247,7 @@
           <a:p>
             <a:fld id="{788D2FFD-E3EC-48A9-9025-ACC8C60B99C3}" type="datetimeFigureOut">
               <a:rPr lang="en-US" smtClean="0"/>
-              <a:t>2/14/2017</a:t>
+              <a:t>7/15/2017</a:t>
             </a:fld>
             <a:endParaRPr lang="en-US"/>
           </a:p>
@@ -333,10 +341,9 @@
           <a:lstStyle/>
           <a:p>
             <a:r>
-              <a:rPr lang="en-US" smtClean="0"/>
+              <a:rPr lang="en-US"/>
               <a:t>Click to edit Master title style</a:t>
             </a:r>
-            <a:endParaRPr lang="en-US"/>
           </a:p>
         </p:txBody>
       </p:sp>
@@ -357,38 +364,37 @@
           <a:p>
             <a:pPr lvl="0"/>
             <a:r>
-              <a:rPr lang="en-US" smtClean="0"/>
+              <a:rPr lang="en-US"/>
               <a:t>Click to edit Master text styles</a:t>
             </a:r>
           </a:p>
           <a:p>
             <a:pPr lvl="1"/>
             <a:r>
-              <a:rPr lang="en-US" smtClean="0"/>
+              <a:rPr lang="en-US"/>
               <a:t>Second level</a:t>
             </a:r>
           </a:p>
           <a:p>
             <a:pPr lvl="2"/>
             <a:r>
-              <a:rPr lang="en-US" smtClean="0"/>
+              <a:rPr lang="en-US"/>
               <a:t>Third level</a:t>
             </a:r>
           </a:p>
           <a:p>
             <a:pPr lvl="3"/>
             <a:r>
-              <a:rPr lang="en-US" smtClean="0"/>
+              <a:rPr lang="en-US"/>
               <a:t>Fourth level</a:t>
             </a:r>
           </a:p>
           <a:p>
             <a:pPr lvl="4"/>
             <a:r>
-              <a:rPr lang="en-US" smtClean="0"/>
+              <a:rPr lang="en-US"/>
               <a:t>Fifth level</a:t>
             </a:r>
-            <a:endParaRPr lang="en-US"/>
           </a:p>
         </p:txBody>
       </p:sp>
@@ -409,7 +415,7 @@
           <a:p>
             <a:fld id="{788D2FFD-E3EC-48A9-9025-ACC8C60B99C3}" type="datetimeFigureOut">
               <a:rPr lang="en-US" smtClean="0"/>
-              <a:t>2/14/2017</a:t>
+              <a:t>7/15/2017</a:t>
             </a:fld>
             <a:endParaRPr lang="en-US"/>
           </a:p>
@@ -508,10 +514,9 @@
           <a:lstStyle/>
           <a:p>
             <a:r>
-              <a:rPr lang="en-US" smtClean="0"/>
+              <a:rPr lang="en-US"/>
               <a:t>Click to edit Master title style</a:t>
             </a:r>
-            <a:endParaRPr lang="en-US"/>
           </a:p>
         </p:txBody>
       </p:sp>
@@ -537,38 +542,37 @@
           <a:p>
             <a:pPr lvl="0"/>
             <a:r>
-              <a:rPr lang="en-US" smtClean="0"/>
+              <a:rPr lang="en-US"/>
               <a:t>Click to edit Master text styles</a:t>
             </a:r>
           </a:p>
           <a:p>
             <a:pPr lvl="1"/>
             <a:r>
-              <a:rPr lang="en-US" smtClean="0"/>
+              <a:rPr lang="en-US"/>
               <a:t>Second level</a:t>
             </a:r>
           </a:p>
           <a:p>
             <a:pPr lvl="2"/>
             <a:r>
-              <a:rPr lang="en-US" smtClean="0"/>
+              <a:rPr lang="en-US"/>
               <a:t>Third level</a:t>
             </a:r>
           </a:p>
           <a:p>
             <a:pPr lvl="3"/>
             <a:r>
-              <a:rPr lang="en-US" smtClean="0"/>
+              <a:rPr lang="en-US"/>
               <a:t>Fourth level</a:t>
             </a:r>
           </a:p>
           <a:p>
             <a:pPr lvl="4"/>
             <a:r>
-              <a:rPr lang="en-US" smtClean="0"/>
+              <a:rPr lang="en-US"/>
               <a:t>Fifth level</a:t>
             </a:r>
-            <a:endParaRPr lang="en-US"/>
           </a:p>
         </p:txBody>
       </p:sp>
@@ -589,7 +593,7 @@
           <a:p>
             <a:fld id="{788D2FFD-E3EC-48A9-9025-ACC8C60B99C3}" type="datetimeFigureOut">
               <a:rPr lang="en-US" smtClean="0"/>
-              <a:t>2/14/2017</a:t>
+              <a:t>7/15/2017</a:t>
             </a:fld>
             <a:endParaRPr lang="en-US"/>
           </a:p>
@@ -683,10 +687,9 @@
           <a:lstStyle/>
           <a:p>
             <a:r>
-              <a:rPr lang="en-US" smtClean="0"/>
+              <a:rPr lang="en-US"/>
               <a:t>Click to edit Master title style</a:t>
             </a:r>
-            <a:endParaRPr lang="en-US"/>
           </a:p>
         </p:txBody>
       </p:sp>
@@ -707,38 +710,37 @@
           <a:p>
             <a:pPr lvl="0"/>
             <a:r>
-              <a:rPr lang="en-US" smtClean="0"/>
+              <a:rPr lang="en-US"/>
               <a:t>Click to edit Master text styles</a:t>
             </a:r>
           </a:p>
           <a:p>
             <a:pPr lvl="1"/>
             <a:r>
-              <a:rPr lang="en-US" smtClean="0"/>
+              <a:rPr lang="en-US"/>
               <a:t>Second level</a:t>
             </a:r>
           </a:p>
           <a:p>
             <a:pPr lvl="2"/>
             <a:r>
-              <a:rPr lang="en-US" smtClean="0"/>
+              <a:rPr lang="en-US"/>
               <a:t>Third level</a:t>
             </a:r>
           </a:p>
           <a:p>
             <a:pPr lvl="3"/>
             <a:r>
-              <a:rPr lang="en-US" smtClean="0"/>
+              <a:rPr lang="en-US"/>
               <a:t>Fourth level</a:t>
             </a:r>
           </a:p>
           <a:p>
             <a:pPr lvl="4"/>
             <a:r>
-              <a:rPr lang="en-US" smtClean="0"/>
+              <a:rPr lang="en-US"/>
               <a:t>Fifth level</a:t>
             </a:r>
-            <a:endParaRPr lang="en-US"/>
           </a:p>
         </p:txBody>
       </p:sp>
@@ -759,7 +761,7 @@
           <a:p>
             <a:fld id="{788D2FFD-E3EC-48A9-9025-ACC8C60B99C3}" type="datetimeFigureOut">
               <a:rPr lang="en-US" smtClean="0"/>
-              <a:t>2/14/2017</a:t>
+              <a:t>7/15/2017</a:t>
             </a:fld>
             <a:endParaRPr lang="en-US"/>
           </a:p>
@@ -862,10 +864,9 @@
           </a:lstStyle>
           <a:p>
             <a:r>
-              <a:rPr lang="en-US" smtClean="0"/>
+              <a:rPr lang="en-US"/>
               <a:t>Click to edit Master title style</a:t>
             </a:r>
-            <a:endParaRPr lang="en-US"/>
           </a:p>
         </p:txBody>
       </p:sp>
@@ -982,7 +983,7 @@
           <a:p>
             <a:pPr lvl="0"/>
             <a:r>
-              <a:rPr lang="en-US" smtClean="0"/>
+              <a:rPr lang="en-US"/>
               <a:t>Click to edit Master text styles</a:t>
             </a:r>
           </a:p>
@@ -1005,7 +1006,7 @@
           <a:p>
             <a:fld id="{788D2FFD-E3EC-48A9-9025-ACC8C60B99C3}" type="datetimeFigureOut">
               <a:rPr lang="en-US" smtClean="0"/>
-              <a:t>2/14/2017</a:t>
+              <a:t>7/15/2017</a:t>
             </a:fld>
             <a:endParaRPr lang="en-US"/>
           </a:p>
@@ -1099,10 +1100,9 @@
           <a:lstStyle/>
           <a:p>
             <a:r>
-              <a:rPr lang="en-US" smtClean="0"/>
+              <a:rPr lang="en-US"/>
               <a:t>Click to edit Master title style</a:t>
             </a:r>
-            <a:endParaRPr lang="en-US"/>
           </a:p>
         </p:txBody>
       </p:sp>
@@ -1128,38 +1128,37 @@
           <a:p>
             <a:pPr lvl="0"/>
             <a:r>
-              <a:rPr lang="en-US" smtClean="0"/>
+              <a:rPr lang="en-US"/>
               <a:t>Click to edit Master text styles</a:t>
             </a:r>
           </a:p>
           <a:p>
             <a:pPr lvl="1"/>
             <a:r>
-              <a:rPr lang="en-US" smtClean="0"/>
+              <a:rPr lang="en-US"/>
               <a:t>Second level</a:t>
             </a:r>
           </a:p>
           <a:p>
             <a:pPr lvl="2"/>
             <a:r>
-              <a:rPr lang="en-US" smtClean="0"/>
+              <a:rPr lang="en-US"/>
               <a:t>Third level</a:t>
             </a:r>
           </a:p>
           <a:p>
             <a:pPr lvl="3"/>
             <a:r>
-              <a:rPr lang="en-US" smtClean="0"/>
+              <a:rPr lang="en-US"/>
               <a:t>Fourth level</a:t>
             </a:r>
           </a:p>
           <a:p>
             <a:pPr lvl="4"/>
             <a:r>
-              <a:rPr lang="en-US" smtClean="0"/>
+              <a:rPr lang="en-US"/>
               <a:t>Fifth level</a:t>
             </a:r>
-            <a:endParaRPr lang="en-US"/>
           </a:p>
         </p:txBody>
       </p:sp>
@@ -1185,38 +1184,37 @@
           <a:p>
             <a:pPr lvl="0"/>
             <a:r>
-              <a:rPr lang="en-US" smtClean="0"/>
+              <a:rPr lang="en-US"/>
               <a:t>Click to edit Master text styles</a:t>
             </a:r>
           </a:p>
           <a:p>
             <a:pPr lvl="1"/>
             <a:r>
-              <a:rPr lang="en-US" smtClean="0"/>
+              <a:rPr lang="en-US"/>
               <a:t>Second level</a:t>
             </a:r>
           </a:p>
           <a:p>
             <a:pPr lvl="2"/>
             <a:r>
-              <a:rPr lang="en-US" smtClean="0"/>
+              <a:rPr lang="en-US"/>
               <a:t>Third level</a:t>
             </a:r>
           </a:p>
           <a:p>
             <a:pPr lvl="3"/>
             <a:r>
-              <a:rPr lang="en-US" smtClean="0"/>
+              <a:rPr lang="en-US"/>
               <a:t>Fourth level</a:t>
             </a:r>
           </a:p>
           <a:p>
             <a:pPr lvl="4"/>
             <a:r>
-              <a:rPr lang="en-US" smtClean="0"/>
+              <a:rPr lang="en-US"/>
               <a:t>Fifth level</a:t>
             </a:r>
-            <a:endParaRPr lang="en-US"/>
           </a:p>
         </p:txBody>
       </p:sp>
@@ -1237,7 +1235,7 @@
           <a:p>
             <a:fld id="{788D2FFD-E3EC-48A9-9025-ACC8C60B99C3}" type="datetimeFigureOut">
               <a:rPr lang="en-US" smtClean="0"/>
-              <a:t>2/14/2017</a:t>
+              <a:t>7/15/2017</a:t>
             </a:fld>
             <a:endParaRPr lang="en-US"/>
           </a:p>
@@ -1336,10 +1334,9 @@
           <a:lstStyle/>
           <a:p>
             <a:r>
-              <a:rPr lang="en-US" smtClean="0"/>
+              <a:rPr lang="en-US"/>
               <a:t>Click to edit Master title style</a:t>
             </a:r>
-            <a:endParaRPr lang="en-US"/>
           </a:p>
         </p:txBody>
       </p:sp>
@@ -1402,7 +1399,7 @@
           <a:p>
             <a:pPr lvl="0"/>
             <a:r>
-              <a:rPr lang="en-US" smtClean="0"/>
+              <a:rPr lang="en-US"/>
               <a:t>Click to edit Master text styles</a:t>
             </a:r>
           </a:p>
@@ -1430,38 +1427,37 @@
           <a:p>
             <a:pPr lvl="0"/>
             <a:r>
-              <a:rPr lang="en-US" smtClean="0"/>
+              <a:rPr lang="en-US"/>
               <a:t>Click to edit Master text styles</a:t>
             </a:r>
           </a:p>
           <a:p>
             <a:pPr lvl="1"/>
             <a:r>
-              <a:rPr lang="en-US" smtClean="0"/>
+              <a:rPr lang="en-US"/>
               <a:t>Second level</a:t>
             </a:r>
           </a:p>
           <a:p>
             <a:pPr lvl="2"/>
             <a:r>
-              <a:rPr lang="en-US" smtClean="0"/>
+              <a:rPr lang="en-US"/>
               <a:t>Third level</a:t>
             </a:r>
           </a:p>
           <a:p>
             <a:pPr lvl="3"/>
             <a:r>
-              <a:rPr lang="en-US" smtClean="0"/>
+              <a:rPr lang="en-US"/>
               <a:t>Fourth level</a:t>
             </a:r>
           </a:p>
           <a:p>
             <a:pPr lvl="4"/>
             <a:r>
-              <a:rPr lang="en-US" smtClean="0"/>
+              <a:rPr lang="en-US"/>
               <a:t>Fifth level</a:t>
             </a:r>
-            <a:endParaRPr lang="en-US"/>
           </a:p>
         </p:txBody>
       </p:sp>
@@ -1524,7 +1520,7 @@
           <a:p>
             <a:pPr lvl="0"/>
             <a:r>
-              <a:rPr lang="en-US" smtClean="0"/>
+              <a:rPr lang="en-US"/>
               <a:t>Click to edit Master text styles</a:t>
             </a:r>
           </a:p>
@@ -1552,38 +1548,37 @@
           <a:p>
             <a:pPr lvl="0"/>
             <a:r>
-              <a:rPr lang="en-US" smtClean="0"/>
+              <a:rPr lang="en-US"/>
               <a:t>Click to edit Master text styles</a:t>
             </a:r>
           </a:p>
           <a:p>
             <a:pPr lvl="1"/>
             <a:r>
-              <a:rPr lang="en-US" smtClean="0"/>
+              <a:rPr lang="en-US"/>
               <a:t>Second level</a:t>
             </a:r>
           </a:p>
           <a:p>
             <a:pPr lvl="2"/>
             <a:r>
-              <a:rPr lang="en-US" smtClean="0"/>
+              <a:rPr lang="en-US"/>
               <a:t>Third level</a:t>
             </a:r>
           </a:p>
           <a:p>
             <a:pPr lvl="3"/>
             <a:r>
-              <a:rPr lang="en-US" smtClean="0"/>
+              <a:rPr lang="en-US"/>
               <a:t>Fourth level</a:t>
             </a:r>
           </a:p>
           <a:p>
             <a:pPr lvl="4"/>
             <a:r>
-              <a:rPr lang="en-US" smtClean="0"/>
+              <a:rPr lang="en-US"/>
               <a:t>Fifth level</a:t>
             </a:r>
-            <a:endParaRPr lang="en-US"/>
           </a:p>
         </p:txBody>
       </p:sp>
@@ -1604,7 +1599,7 @@
           <a:p>
             <a:fld id="{788D2FFD-E3EC-48A9-9025-ACC8C60B99C3}" type="datetimeFigureOut">
               <a:rPr lang="en-US" smtClean="0"/>
-              <a:t>2/14/2017</a:t>
+              <a:t>7/15/2017</a:t>
             </a:fld>
             <a:endParaRPr lang="en-US"/>
           </a:p>
@@ -1698,10 +1693,9 @@
           <a:lstStyle/>
           <a:p>
             <a:r>
-              <a:rPr lang="en-US" smtClean="0"/>
+              <a:rPr lang="en-US"/>
               <a:t>Click to edit Master title style</a:t>
             </a:r>
-            <a:endParaRPr lang="en-US"/>
           </a:p>
         </p:txBody>
       </p:sp>
@@ -1722,7 +1716,7 @@
           <a:p>
             <a:fld id="{788D2FFD-E3EC-48A9-9025-ACC8C60B99C3}" type="datetimeFigureOut">
               <a:rPr lang="en-US" smtClean="0"/>
-              <a:t>2/14/2017</a:t>
+              <a:t>7/15/2017</a:t>
             </a:fld>
             <a:endParaRPr lang="en-US"/>
           </a:p>
@@ -1817,7 +1811,7 @@
           <a:p>
             <a:fld id="{788D2FFD-E3EC-48A9-9025-ACC8C60B99C3}" type="datetimeFigureOut">
               <a:rPr lang="en-US" smtClean="0"/>
-              <a:t>2/14/2017</a:t>
+              <a:t>7/15/2017</a:t>
             </a:fld>
             <a:endParaRPr lang="en-US"/>
           </a:p>
@@ -1920,10 +1914,9 @@
           </a:lstStyle>
           <a:p>
             <a:r>
-              <a:rPr lang="en-US" smtClean="0"/>
+              <a:rPr lang="en-US"/>
               <a:t>Click to edit Master title style</a:t>
             </a:r>
-            <a:endParaRPr lang="en-US"/>
           </a:p>
         </p:txBody>
       </p:sp>
@@ -1977,38 +1970,37 @@
           <a:p>
             <a:pPr lvl="0"/>
             <a:r>
-              <a:rPr lang="en-US" smtClean="0"/>
+              <a:rPr lang="en-US"/>
               <a:t>Click to edit Master text styles</a:t>
             </a:r>
           </a:p>
           <a:p>
             <a:pPr lvl="1"/>
             <a:r>
-              <a:rPr lang="en-US" smtClean="0"/>
+              <a:rPr lang="en-US"/>
               <a:t>Second level</a:t>
             </a:r>
           </a:p>
           <a:p>
             <a:pPr lvl="2"/>
             <a:r>
-              <a:rPr lang="en-US" smtClean="0"/>
+              <a:rPr lang="en-US"/>
               <a:t>Third level</a:t>
             </a:r>
           </a:p>
           <a:p>
             <a:pPr lvl="3"/>
             <a:r>
-              <a:rPr lang="en-US" smtClean="0"/>
+              <a:rPr lang="en-US"/>
               <a:t>Fourth level</a:t>
             </a:r>
           </a:p>
           <a:p>
             <a:pPr lvl="4"/>
             <a:r>
-              <a:rPr lang="en-US" smtClean="0"/>
+              <a:rPr lang="en-US"/>
               <a:t>Fifth level</a:t>
             </a:r>
-            <a:endParaRPr lang="en-US"/>
           </a:p>
         </p:txBody>
       </p:sp>
@@ -2071,7 +2063,7 @@
           <a:p>
             <a:pPr lvl="0"/>
             <a:r>
-              <a:rPr lang="en-US" smtClean="0"/>
+              <a:rPr lang="en-US"/>
               <a:t>Click to edit Master text styles</a:t>
             </a:r>
           </a:p>
@@ -2094,7 +2086,7 @@
           <a:p>
             <a:fld id="{788D2FFD-E3EC-48A9-9025-ACC8C60B99C3}" type="datetimeFigureOut">
               <a:rPr lang="en-US" smtClean="0"/>
-              <a:t>2/14/2017</a:t>
+              <a:t>7/15/2017</a:t>
             </a:fld>
             <a:endParaRPr lang="en-US"/>
           </a:p>
@@ -2197,10 +2189,9 @@
           </a:lstStyle>
           <a:p>
             <a:r>
-              <a:rPr lang="en-US" smtClean="0"/>
+              <a:rPr lang="en-US"/>
               <a:t>Click to edit Master title style</a:t>
             </a:r>
-            <a:endParaRPr lang="en-US"/>
           </a:p>
         </p:txBody>
       </p:sp>
@@ -2324,7 +2315,7 @@
           <a:p>
             <a:pPr lvl="0"/>
             <a:r>
-              <a:rPr lang="en-US" smtClean="0"/>
+              <a:rPr lang="en-US"/>
               <a:t>Click to edit Master text styles</a:t>
             </a:r>
           </a:p>
@@ -2347,7 +2338,7 @@
           <a:p>
             <a:fld id="{788D2FFD-E3EC-48A9-9025-ACC8C60B99C3}" type="datetimeFigureOut">
               <a:rPr lang="en-US" smtClean="0"/>
-              <a:t>2/14/2017</a:t>
+              <a:t>7/15/2017</a:t>
             </a:fld>
             <a:endParaRPr lang="en-US"/>
           </a:p>
@@ -2456,10 +2447,9 @@
           <a:lstStyle/>
           <a:p>
             <a:r>
-              <a:rPr lang="en-US" smtClean="0"/>
+              <a:rPr lang="en-US"/>
               <a:t>Click to edit Master title style</a:t>
             </a:r>
-            <a:endParaRPr lang="en-US"/>
           </a:p>
         </p:txBody>
       </p:sp>
@@ -2490,38 +2480,37 @@
           <a:p>
             <a:pPr lvl="0"/>
             <a:r>
-              <a:rPr lang="en-US" smtClean="0"/>
+              <a:rPr lang="en-US"/>
               <a:t>Click to edit Master text styles</a:t>
             </a:r>
           </a:p>
           <a:p>
             <a:pPr lvl="1"/>
             <a:r>
-              <a:rPr lang="en-US" smtClean="0"/>
+              <a:rPr lang="en-US"/>
               <a:t>Second level</a:t>
             </a:r>
           </a:p>
           <a:p>
             <a:pPr lvl="2"/>
             <a:r>
-              <a:rPr lang="en-US" smtClean="0"/>
+              <a:rPr lang="en-US"/>
               <a:t>Third level</a:t>
             </a:r>
           </a:p>
           <a:p>
             <a:pPr lvl="3"/>
             <a:r>
-              <a:rPr lang="en-US" smtClean="0"/>
+              <a:rPr lang="en-US"/>
               <a:t>Fourth level</a:t>
             </a:r>
           </a:p>
           <a:p>
             <a:pPr lvl="4"/>
             <a:r>
-              <a:rPr lang="en-US" smtClean="0"/>
+              <a:rPr lang="en-US"/>
               <a:t>Fifth level</a:t>
             </a:r>
-            <a:endParaRPr lang="en-US"/>
           </a:p>
         </p:txBody>
       </p:sp>
@@ -2560,7 +2549,7 @@
           <a:p>
             <a:fld id="{788D2FFD-E3EC-48A9-9025-ACC8C60B99C3}" type="datetimeFigureOut">
               <a:rPr lang="en-US" smtClean="0"/>
-              <a:t>2/14/2017</a:t>
+              <a:t>7/15/2017</a:t>
             </a:fld>
             <a:endParaRPr lang="en-US"/>
           </a:p>
@@ -3149,7 +3138,7 @@
           <a:p>
             <a:pPr algn="ctr"/>
             <a:r>
-              <a:rPr lang="en-US" dirty="0" smtClean="0">
+              <a:rPr lang="en-US" dirty="0">
                 <a:solidFill>
                   <a:schemeClr val="tx1"/>
                 </a:solidFill>
@@ -3167,7 +3156,7 @@
           </a:p>
           <a:p>
             <a:pPr algn="ctr"/>
-            <a:endParaRPr lang="en-US" dirty="0" smtClean="0">
+            <a:endParaRPr lang="en-US" dirty="0">
               <a:solidFill>
                 <a:schemeClr val="tx1"/>
               </a:solidFill>
@@ -3183,7 +3172,7 @@
           </a:p>
           <a:p>
             <a:pPr algn="ctr"/>
-            <a:endParaRPr lang="en-US" dirty="0" smtClean="0">
+            <a:endParaRPr lang="en-US" dirty="0">
               <a:solidFill>
                 <a:schemeClr val="tx1"/>
               </a:solidFill>
@@ -3199,7 +3188,7 @@
           </a:p>
           <a:p>
             <a:pPr algn="ctr"/>
-            <a:endParaRPr lang="en-US" dirty="0" smtClean="0">
+            <a:endParaRPr lang="en-US" dirty="0">
               <a:solidFill>
                 <a:schemeClr val="tx1"/>
               </a:solidFill>
@@ -3215,7 +3204,7 @@
           </a:p>
           <a:p>
             <a:pPr algn="ctr"/>
-            <a:endParaRPr lang="en-US" dirty="0" smtClean="0">
+            <a:endParaRPr lang="en-US" dirty="0">
               <a:solidFill>
                 <a:schemeClr val="tx1"/>
               </a:solidFill>
@@ -3231,7 +3220,7 @@
           </a:p>
           <a:p>
             <a:pPr algn="ctr"/>
-            <a:endParaRPr lang="en-US" dirty="0" smtClean="0">
+            <a:endParaRPr lang="en-US" dirty="0">
               <a:solidFill>
                 <a:schemeClr val="tx1"/>
               </a:solidFill>
@@ -3247,7 +3236,7 @@
           </a:p>
           <a:p>
             <a:pPr algn="ctr"/>
-            <a:endParaRPr lang="en-US" dirty="0" smtClean="0">
+            <a:endParaRPr lang="en-US" dirty="0">
               <a:solidFill>
                 <a:schemeClr val="tx1"/>
               </a:solidFill>
@@ -3263,7 +3252,7 @@
           </a:p>
           <a:p>
             <a:pPr algn="ctr"/>
-            <a:endParaRPr lang="en-US" dirty="0" smtClean="0">
+            <a:endParaRPr lang="en-US" dirty="0">
               <a:solidFill>
                 <a:schemeClr val="tx1"/>
               </a:solidFill>
@@ -3279,7 +3268,7 @@
           </a:p>
           <a:p>
             <a:pPr algn="ctr"/>
-            <a:endParaRPr lang="en-US" dirty="0" smtClean="0">
+            <a:endParaRPr lang="en-US" dirty="0">
               <a:solidFill>
                 <a:schemeClr val="tx1"/>
               </a:solidFill>
@@ -3295,7 +3284,7 @@
           </a:p>
           <a:p>
             <a:pPr algn="ctr"/>
-            <a:endParaRPr lang="en-US" dirty="0" smtClean="0">
+            <a:endParaRPr lang="en-US" dirty="0">
               <a:solidFill>
                 <a:schemeClr val="tx1"/>
               </a:solidFill>
@@ -3311,7 +3300,7 @@
           </a:p>
           <a:p>
             <a:pPr algn="ctr"/>
-            <a:endParaRPr lang="en-US" dirty="0" smtClean="0">
+            <a:endParaRPr lang="en-US" dirty="0">
               <a:solidFill>
                 <a:schemeClr val="tx1"/>
               </a:solidFill>
@@ -3356,10 +3345,9 @@
           <a:p>
             <a:pPr algn="ctr"/>
             <a:r>
-              <a:rPr lang="en-US" dirty="0" smtClean="0"/>
+              <a:rPr lang="en-US" dirty="0"/>
               <a:t>Physics Engine</a:t>
             </a:r>
-            <a:endParaRPr lang="en-US" dirty="0"/>
           </a:p>
         </p:txBody>
       </p:sp>
@@ -3400,10 +3388,9 @@
           <a:p>
             <a:pPr algn="ctr"/>
             <a:r>
-              <a:rPr lang="en-US" dirty="0" smtClean="0"/>
+              <a:rPr lang="en-US" dirty="0"/>
               <a:t>Sensor Models</a:t>
             </a:r>
-            <a:endParaRPr lang="en-US" dirty="0"/>
           </a:p>
         </p:txBody>
       </p:sp>
@@ -3444,10 +3431,9 @@
           <a:p>
             <a:pPr algn="ctr"/>
             <a:r>
-              <a:rPr lang="en-US" dirty="0" smtClean="0"/>
+              <a:rPr lang="en-US" dirty="0"/>
               <a:t>Vehicle Model</a:t>
             </a:r>
-            <a:endParaRPr lang="en-US" dirty="0"/>
           </a:p>
         </p:txBody>
       </p:sp>
@@ -3488,10 +3474,9 @@
           <a:p>
             <a:pPr algn="ctr"/>
             <a:r>
-              <a:rPr lang="en-US" dirty="0" smtClean="0"/>
+              <a:rPr lang="en-US" dirty="0"/>
               <a:t>Rendering Engine</a:t>
             </a:r>
-            <a:endParaRPr lang="en-US" dirty="0"/>
           </a:p>
         </p:txBody>
       </p:sp>
@@ -3538,37 +3523,32 @@
           <a:p>
             <a:pPr algn="ctr"/>
             <a:r>
-              <a:rPr lang="en-US" dirty="0" smtClean="0">
+              <a:rPr lang="en-US" dirty="0">
                 <a:solidFill>
                   <a:schemeClr val="tx1"/>
                 </a:solidFill>
               </a:rPr>
-              <a:t>Decision Making Engine</a:t>
+              <a:t>Companion Computer</a:t>
             </a:r>
           </a:p>
           <a:p>
             <a:pPr algn="ctr"/>
-            <a:endParaRPr lang="en-US" dirty="0" smtClean="0">
-              <a:solidFill>
-                <a:schemeClr val="tx1"/>
-              </a:solidFill>
-            </a:endParaRPr>
-          </a:p>
-          <a:p>
-            <a:pPr algn="ctr"/>
-            <a:r>
-              <a:rPr lang="en-US" dirty="0" smtClean="0">
-                <a:solidFill>
-                  <a:schemeClr val="tx1"/>
-                </a:solidFill>
-              </a:rPr>
-              <a:t>(Path Planning, Controls, Action Selection etc.)</a:t>
-            </a:r>
             <a:endParaRPr lang="en-US" dirty="0">
               <a:solidFill>
                 <a:schemeClr val="tx1"/>
               </a:solidFill>
             </a:endParaRPr>
+          </a:p>
+          <a:p>
+            <a:pPr algn="ctr"/>
+            <a:r>
+              <a:rPr lang="en-US" dirty="0">
+                <a:solidFill>
+                  <a:schemeClr val="tx1"/>
+                </a:solidFill>
+              </a:rPr>
+              <a:t>(Path Planning, Mission Planning, SLAM etc.)</a:t>
+            </a:r>
           </a:p>
         </p:txBody>
       </p:sp>
@@ -3639,12 +3619,12 @@
           <a:p>
             <a:pPr algn="ctr"/>
             <a:r>
-              <a:rPr lang="en-US" dirty="0" smtClean="0">
+              <a:rPr lang="en-US" dirty="0">
                 <a:solidFill>
                   <a:schemeClr val="tx1"/>
                 </a:solidFill>
               </a:rPr>
-              <a:t>Flight Controller Hardware</a:t>
+              <a:t>Flight Controller Firmware</a:t>
             </a:r>
           </a:p>
           <a:p>
@@ -3657,7 +3637,7 @@
           </a:p>
           <a:p>
             <a:pPr algn="ctr"/>
-            <a:endParaRPr lang="en-US" dirty="0" smtClean="0">
+            <a:endParaRPr lang="en-US" dirty="0">
               <a:solidFill>
                 <a:schemeClr val="tx1"/>
               </a:solidFill>
@@ -3673,7 +3653,7 @@
           </a:p>
           <a:p>
             <a:pPr algn="ctr"/>
-            <a:endParaRPr lang="en-US" dirty="0" smtClean="0">
+            <a:endParaRPr lang="en-US" dirty="0">
               <a:solidFill>
                 <a:schemeClr val="tx1"/>
               </a:solidFill>
@@ -3918,10 +3898,9 @@
           <a:p>
             <a:pPr algn="ctr"/>
             <a:r>
-              <a:rPr lang="en-US" dirty="0" smtClean="0"/>
+              <a:rPr lang="en-US" dirty="0"/>
               <a:t>Data Collection</a:t>
             </a:r>
-            <a:endParaRPr lang="en-US" dirty="0"/>
           </a:p>
         </p:txBody>
       </p:sp>
@@ -4106,10 +4085,9 @@
           <a:p>
             <a:pPr algn="ctr"/>
             <a:r>
-              <a:rPr lang="en-US" dirty="0" smtClean="0"/>
+              <a:rPr lang="en-US" dirty="0"/>
               <a:t>Environment Model</a:t>
             </a:r>
-            <a:endParaRPr lang="en-US" dirty="0"/>
           </a:p>
         </p:txBody>
       </p:sp>
@@ -4361,8 +4339,8 @@
         </p:nvSpPr>
         <p:spPr>
           <a:xfrm rot="19733951">
-            <a:off x="4684750" y="2009059"/>
-            <a:ext cx="1386213" cy="276999"/>
+            <a:off x="4782021" y="2009059"/>
+            <a:ext cx="1191673" cy="276999"/>
           </a:xfrm>
           <a:prstGeom prst="rect">
             <a:avLst/>
@@ -4376,10 +4354,9 @@
           <a:lstStyle/>
           <a:p>
             <a:r>
-              <a:rPr lang="en-US" sz="1200" dirty="0" smtClean="0"/>
-              <a:t>Control Commands</a:t>
-            </a:r>
-            <a:endParaRPr lang="en-US" sz="1200" dirty="0"/>
+              <a:rPr lang="en-US" sz="1200" dirty="0"/>
+              <a:t>Actuator Signals</a:t>
+            </a:r>
           </a:p>
         </p:txBody>
       </p:sp>
@@ -4391,8 +4368,8 @@
         </p:nvSpPr>
         <p:spPr>
           <a:xfrm rot="2501806">
-            <a:off x="4924408" y="3784052"/>
-            <a:ext cx="1203086" cy="276999"/>
+            <a:off x="4639899" y="3726669"/>
+            <a:ext cx="1577740" cy="276999"/>
           </a:xfrm>
           <a:prstGeom prst="rect">
             <a:avLst/>
@@ -4406,10 +4383,9 @@
           <a:lstStyle/>
           <a:p>
             <a:r>
-              <a:rPr lang="en-US" sz="1200" dirty="0" smtClean="0"/>
-              <a:t>Sensor Readings</a:t>
-            </a:r>
-            <a:endParaRPr lang="en-US" sz="1200" dirty="0"/>
+              <a:rPr lang="en-US" sz="1200" dirty="0"/>
+              <a:t>Simulated Sensor data</a:t>
+            </a:r>
           </a:p>
         </p:txBody>
       </p:sp>
@@ -4475,6 +4451,2223 @@
 </file>
 
 <file path=ppt/slides/slide2.xml><?xml version="1.0" encoding="utf-8"?>
+<p:sld xmlns:a="http://schemas.openxmlformats.org/drawingml/2006/main" xmlns:r="http://schemas.openxmlformats.org/officeDocument/2006/relationships" xmlns:p="http://schemas.openxmlformats.org/presentationml/2006/main">
+  <p:cSld>
+    <p:spTree>
+      <p:nvGrpSpPr>
+        <p:cNvPr id="1" name=""/>
+        <p:cNvGrpSpPr/>
+        <p:nvPr/>
+      </p:nvGrpSpPr>
+      <p:grpSpPr>
+        <a:xfrm>
+          <a:off x="0" y="0"/>
+          <a:ext cx="0" cy="0"/>
+          <a:chOff x="0" y="0"/>
+          <a:chExt cx="0" cy="0"/>
+        </a:xfrm>
+      </p:grpSpPr>
+      <p:pic>
+        <p:nvPicPr>
+          <p:cNvPr id="1028" name="Picture 4" descr="Image result for rc controller taranis"/>
+          <p:cNvPicPr>
+            <a:picLocks noChangeAspect="1" noChangeArrowheads="1"/>
+          </p:cNvPicPr>
+          <p:nvPr/>
+        </p:nvPicPr>
+        <p:blipFill>
+          <a:blip r:embed="rId2" cstate="print">
+            <a:extLst>
+              <a:ext uri="{28A0092B-C50C-407E-A947-70E740481C1C}">
+                <a14:useLocalDpi xmlns:a14="http://schemas.microsoft.com/office/drawing/2010/main" val="0"/>
+              </a:ext>
+            </a:extLst>
+          </a:blip>
+          <a:srcRect/>
+          <a:stretch>
+            <a:fillRect/>
+          </a:stretch>
+        </p:blipFill>
+        <p:spPr bwMode="auto">
+          <a:xfrm>
+            <a:off x="260810" y="4723827"/>
+            <a:ext cx="1192495" cy="1192495"/>
+          </a:xfrm>
+          <a:prstGeom prst="rect">
+            <a:avLst/>
+          </a:prstGeom>
+          <a:noFill/>
+          <a:extLst>
+            <a:ext uri="{909E8E84-426E-40DD-AFC4-6F175D3DCCD1}">
+              <a14:hiddenFill xmlns:a14="http://schemas.microsoft.com/office/drawing/2010/main">
+                <a:solidFill>
+                  <a:srgbClr val="FFFFFF"/>
+                </a:solidFill>
+              </a14:hiddenFill>
+            </a:ext>
+          </a:extLst>
+        </p:spPr>
+      </p:pic>
+      <p:pic>
+        <p:nvPicPr>
+          <p:cNvPr id="1029" name="Picture 1" descr="image002"/>
+          <p:cNvPicPr>
+            <a:picLocks noChangeAspect="1" noChangeArrowheads="1"/>
+          </p:cNvPicPr>
+          <p:nvPr/>
+        </p:nvPicPr>
+        <p:blipFill>
+          <a:blip r:embed="rId3" cstate="print">
+            <a:extLst>
+              <a:ext uri="{28A0092B-C50C-407E-A947-70E740481C1C}">
+                <a14:useLocalDpi xmlns:a14="http://schemas.microsoft.com/office/drawing/2010/main" val="0"/>
+              </a:ext>
+            </a:extLst>
+          </a:blip>
+          <a:srcRect/>
+          <a:stretch>
+            <a:fillRect/>
+          </a:stretch>
+        </p:blipFill>
+        <p:spPr bwMode="auto">
+          <a:xfrm>
+            <a:off x="1921576" y="0"/>
+            <a:ext cx="2542651" cy="1577087"/>
+          </a:xfrm>
+          <a:prstGeom prst="rect">
+            <a:avLst/>
+          </a:prstGeom>
+          <a:noFill/>
+          <a:ln>
+            <a:noFill/>
+          </a:ln>
+          <a:extLst>
+            <a:ext uri="{909E8E84-426E-40DD-AFC4-6F175D3DCCD1}">
+              <a14:hiddenFill xmlns:a14="http://schemas.microsoft.com/office/drawing/2010/main">
+                <a:solidFill>
+                  <a:srgbClr val="FFFFFF"/>
+                </a:solidFill>
+              </a14:hiddenFill>
+            </a:ext>
+            <a:ext uri="{91240B29-F687-4F45-9708-019B960494DF}">
+              <a14:hiddenLine xmlns:a14="http://schemas.microsoft.com/office/drawing/2010/main" w="9525">
+                <a:solidFill>
+                  <a:srgbClr val="000000"/>
+                </a:solidFill>
+                <a:miter lim="800000"/>
+                <a:headEnd/>
+                <a:tailEnd/>
+              </a14:hiddenLine>
+            </a:ext>
+          </a:extLst>
+        </p:spPr>
+      </p:pic>
+      <p:pic>
+        <p:nvPicPr>
+          <p:cNvPr id="1034" name="Picture 10" descr="Image result for DJI flight controller"/>
+          <p:cNvPicPr>
+            <a:picLocks noChangeAspect="1" noChangeArrowheads="1"/>
+          </p:cNvPicPr>
+          <p:nvPr/>
+        </p:nvPicPr>
+        <p:blipFill>
+          <a:blip r:embed="rId4" cstate="print">
+            <a:extLst>
+              <a:ext uri="{28A0092B-C50C-407E-A947-70E740481C1C}">
+                <a14:useLocalDpi xmlns:a14="http://schemas.microsoft.com/office/drawing/2010/main" val="0"/>
+              </a:ext>
+            </a:extLst>
+          </a:blip>
+          <a:srcRect/>
+          <a:stretch>
+            <a:fillRect/>
+          </a:stretch>
+        </p:blipFill>
+        <p:spPr bwMode="auto">
+          <a:xfrm>
+            <a:off x="2679788" y="3029675"/>
+            <a:ext cx="2105635" cy="1052818"/>
+          </a:xfrm>
+          <a:prstGeom prst="rect">
+            <a:avLst/>
+          </a:prstGeom>
+          <a:ln>
+            <a:noFill/>
+          </a:ln>
+          <a:effectLst>
+            <a:softEdge rad="112500"/>
+          </a:effectLst>
+          <a:extLst>
+            <a:ext uri="{909E8E84-426E-40DD-AFC4-6F175D3DCCD1}">
+              <a14:hiddenFill xmlns:a14="http://schemas.microsoft.com/office/drawing/2010/main">
+                <a:solidFill>
+                  <a:srgbClr val="FFFFFF"/>
+                </a:solidFill>
+              </a14:hiddenFill>
+            </a:ext>
+          </a:extLst>
+        </p:spPr>
+      </p:pic>
+      <p:sp>
+        <p:nvSpPr>
+          <p:cNvPr id="6" name="Rounded Rectangle 5"/>
+          <p:cNvSpPr/>
+          <p:nvPr/>
+        </p:nvSpPr>
+        <p:spPr>
+          <a:xfrm>
+            <a:off x="5987383" y="218114"/>
+            <a:ext cx="5800988" cy="6111380"/>
+          </a:xfrm>
+          <a:prstGeom prst="roundRect">
+            <a:avLst/>
+          </a:prstGeom>
+          <a:noFill/>
+          <a:ln w="50800">
+            <a:solidFill>
+              <a:schemeClr val="tx1"/>
+            </a:solidFill>
+          </a:ln>
+        </p:spPr>
+        <p:style>
+          <a:lnRef idx="2">
+            <a:schemeClr val="accent1">
+              <a:shade val="50000"/>
+            </a:schemeClr>
+          </a:lnRef>
+          <a:fillRef idx="1">
+            <a:schemeClr val="accent1"/>
+          </a:fillRef>
+          <a:effectRef idx="0">
+            <a:schemeClr val="accent1"/>
+          </a:effectRef>
+          <a:fontRef idx="minor">
+            <a:schemeClr val="lt1"/>
+          </a:fontRef>
+        </p:style>
+        <p:txBody>
+          <a:bodyPr rtlCol="0" anchor="ctr"/>
+          <a:lstStyle/>
+          <a:p>
+            <a:pPr algn="ctr"/>
+            <a:r>
+              <a:rPr lang="en-US" sz="2400" dirty="0">
+                <a:solidFill>
+                  <a:schemeClr val="tx1"/>
+                </a:solidFill>
+              </a:rPr>
+              <a:t>Simulator</a:t>
+            </a:r>
+          </a:p>
+          <a:p>
+            <a:pPr algn="ctr"/>
+            <a:endParaRPr lang="en-US" dirty="0">
+              <a:solidFill>
+                <a:schemeClr val="tx1"/>
+              </a:solidFill>
+            </a:endParaRPr>
+          </a:p>
+          <a:p>
+            <a:pPr algn="ctr"/>
+            <a:endParaRPr lang="en-US" dirty="0">
+              <a:solidFill>
+                <a:schemeClr val="tx1"/>
+              </a:solidFill>
+            </a:endParaRPr>
+          </a:p>
+          <a:p>
+            <a:pPr algn="ctr"/>
+            <a:endParaRPr lang="en-US" dirty="0">
+              <a:solidFill>
+                <a:schemeClr val="tx1"/>
+              </a:solidFill>
+            </a:endParaRPr>
+          </a:p>
+          <a:p>
+            <a:pPr algn="ctr"/>
+            <a:endParaRPr lang="en-US" dirty="0">
+              <a:solidFill>
+                <a:schemeClr val="tx1"/>
+              </a:solidFill>
+            </a:endParaRPr>
+          </a:p>
+          <a:p>
+            <a:pPr algn="ctr"/>
+            <a:endParaRPr lang="en-US" dirty="0">
+              <a:solidFill>
+                <a:schemeClr val="tx1"/>
+              </a:solidFill>
+            </a:endParaRPr>
+          </a:p>
+          <a:p>
+            <a:pPr algn="ctr"/>
+            <a:endParaRPr lang="en-US" dirty="0">
+              <a:solidFill>
+                <a:schemeClr val="tx1"/>
+              </a:solidFill>
+            </a:endParaRPr>
+          </a:p>
+          <a:p>
+            <a:pPr algn="ctr"/>
+            <a:endParaRPr lang="en-US" dirty="0">
+              <a:solidFill>
+                <a:schemeClr val="tx1"/>
+              </a:solidFill>
+            </a:endParaRPr>
+          </a:p>
+          <a:p>
+            <a:pPr algn="ctr"/>
+            <a:endParaRPr lang="en-US" dirty="0">
+              <a:solidFill>
+                <a:schemeClr val="tx1"/>
+              </a:solidFill>
+            </a:endParaRPr>
+          </a:p>
+          <a:p>
+            <a:pPr algn="ctr"/>
+            <a:endParaRPr lang="en-US" dirty="0">
+              <a:solidFill>
+                <a:schemeClr val="tx1"/>
+              </a:solidFill>
+            </a:endParaRPr>
+          </a:p>
+          <a:p>
+            <a:pPr algn="ctr"/>
+            <a:endParaRPr lang="en-US" dirty="0">
+              <a:solidFill>
+                <a:schemeClr val="tx1"/>
+              </a:solidFill>
+            </a:endParaRPr>
+          </a:p>
+          <a:p>
+            <a:pPr algn="ctr"/>
+            <a:endParaRPr lang="en-US" dirty="0">
+              <a:solidFill>
+                <a:schemeClr val="tx1"/>
+              </a:solidFill>
+            </a:endParaRPr>
+          </a:p>
+          <a:p>
+            <a:pPr algn="ctr"/>
+            <a:endParaRPr lang="en-US" dirty="0">
+              <a:solidFill>
+                <a:schemeClr val="tx1"/>
+              </a:solidFill>
+            </a:endParaRPr>
+          </a:p>
+          <a:p>
+            <a:pPr algn="ctr"/>
+            <a:endParaRPr lang="en-US" dirty="0">
+              <a:solidFill>
+                <a:schemeClr val="tx1"/>
+              </a:solidFill>
+            </a:endParaRPr>
+          </a:p>
+          <a:p>
+            <a:pPr algn="ctr"/>
+            <a:endParaRPr lang="en-US" dirty="0">
+              <a:solidFill>
+                <a:schemeClr val="tx1"/>
+              </a:solidFill>
+            </a:endParaRPr>
+          </a:p>
+          <a:p>
+            <a:pPr algn="ctr"/>
+            <a:endParaRPr lang="en-US" dirty="0">
+              <a:solidFill>
+                <a:schemeClr val="tx1"/>
+              </a:solidFill>
+            </a:endParaRPr>
+          </a:p>
+          <a:p>
+            <a:pPr algn="ctr"/>
+            <a:endParaRPr lang="en-US" dirty="0">
+              <a:solidFill>
+                <a:schemeClr val="tx1"/>
+              </a:solidFill>
+            </a:endParaRPr>
+          </a:p>
+          <a:p>
+            <a:pPr algn="ctr"/>
+            <a:endParaRPr lang="en-US" dirty="0">
+              <a:solidFill>
+                <a:schemeClr val="tx1"/>
+              </a:solidFill>
+            </a:endParaRPr>
+          </a:p>
+          <a:p>
+            <a:pPr algn="ctr"/>
+            <a:endParaRPr lang="en-US" dirty="0">
+              <a:solidFill>
+                <a:schemeClr val="tx1"/>
+              </a:solidFill>
+            </a:endParaRPr>
+          </a:p>
+          <a:p>
+            <a:pPr algn="ctr"/>
+            <a:endParaRPr lang="en-US" dirty="0">
+              <a:solidFill>
+                <a:schemeClr val="tx1"/>
+              </a:solidFill>
+            </a:endParaRPr>
+          </a:p>
+          <a:p>
+            <a:pPr algn="ctr"/>
+            <a:endParaRPr lang="en-US" dirty="0">
+              <a:solidFill>
+                <a:schemeClr val="tx1"/>
+              </a:solidFill>
+            </a:endParaRPr>
+          </a:p>
+        </p:txBody>
+      </p:sp>
+      <p:sp>
+        <p:nvSpPr>
+          <p:cNvPr id="8" name="Rectangle 7"/>
+          <p:cNvSpPr/>
+          <p:nvPr/>
+        </p:nvSpPr>
+        <p:spPr>
+          <a:xfrm>
+            <a:off x="9384915" y="2958533"/>
+            <a:ext cx="1931929" cy="630541"/>
+          </a:xfrm>
+          <a:prstGeom prst="rect">
+            <a:avLst/>
+          </a:prstGeom>
+        </p:spPr>
+        <p:style>
+          <a:lnRef idx="2">
+            <a:schemeClr val="accent1">
+              <a:shade val="50000"/>
+            </a:schemeClr>
+          </a:lnRef>
+          <a:fillRef idx="1">
+            <a:schemeClr val="accent1"/>
+          </a:fillRef>
+          <a:effectRef idx="0">
+            <a:schemeClr val="accent1"/>
+          </a:effectRef>
+          <a:fontRef idx="minor">
+            <a:schemeClr val="lt1"/>
+          </a:fontRef>
+        </p:style>
+        <p:txBody>
+          <a:bodyPr rtlCol="0" anchor="ctr"/>
+          <a:lstStyle/>
+          <a:p>
+            <a:pPr algn="ctr"/>
+            <a:r>
+              <a:rPr lang="en-US" dirty="0"/>
+              <a:t>Physics Engine</a:t>
+            </a:r>
+          </a:p>
+        </p:txBody>
+      </p:sp>
+      <p:sp>
+        <p:nvSpPr>
+          <p:cNvPr id="11" name="Rectangle 10"/>
+          <p:cNvSpPr/>
+          <p:nvPr/>
+        </p:nvSpPr>
+        <p:spPr>
+          <a:xfrm>
+            <a:off x="6604759" y="2934733"/>
+            <a:ext cx="1611910" cy="654341"/>
+          </a:xfrm>
+          <a:prstGeom prst="rect">
+            <a:avLst/>
+          </a:prstGeom>
+        </p:spPr>
+        <p:style>
+          <a:lnRef idx="2">
+            <a:schemeClr val="accent1">
+              <a:shade val="50000"/>
+            </a:schemeClr>
+          </a:lnRef>
+          <a:fillRef idx="1">
+            <a:schemeClr val="accent1"/>
+          </a:fillRef>
+          <a:effectRef idx="0">
+            <a:schemeClr val="accent1"/>
+          </a:effectRef>
+          <a:fontRef idx="minor">
+            <a:schemeClr val="lt1"/>
+          </a:fontRef>
+        </p:style>
+        <p:txBody>
+          <a:bodyPr rtlCol="0" anchor="ctr"/>
+          <a:lstStyle/>
+          <a:p>
+            <a:pPr algn="ctr"/>
+            <a:r>
+              <a:rPr lang="en-US" dirty="0"/>
+              <a:t>Sensor Models</a:t>
+            </a:r>
+          </a:p>
+        </p:txBody>
+      </p:sp>
+      <p:sp>
+        <p:nvSpPr>
+          <p:cNvPr id="13" name="Rectangle 12"/>
+          <p:cNvSpPr/>
+          <p:nvPr/>
+        </p:nvSpPr>
+        <p:spPr>
+          <a:xfrm>
+            <a:off x="6508632" y="980039"/>
+            <a:ext cx="2212575" cy="820812"/>
+          </a:xfrm>
+          <a:prstGeom prst="rect">
+            <a:avLst/>
+          </a:prstGeom>
+        </p:spPr>
+        <p:style>
+          <a:lnRef idx="2">
+            <a:schemeClr val="accent1">
+              <a:shade val="50000"/>
+            </a:schemeClr>
+          </a:lnRef>
+          <a:fillRef idx="1">
+            <a:schemeClr val="accent1"/>
+          </a:fillRef>
+          <a:effectRef idx="0">
+            <a:schemeClr val="accent1"/>
+          </a:effectRef>
+          <a:fontRef idx="minor">
+            <a:schemeClr val="lt1"/>
+          </a:fontRef>
+        </p:style>
+        <p:txBody>
+          <a:bodyPr rtlCol="0" anchor="ctr"/>
+          <a:lstStyle/>
+          <a:p>
+            <a:pPr algn="ctr"/>
+            <a:r>
+              <a:rPr lang="en-US" dirty="0"/>
+              <a:t>Vehicle Model</a:t>
+            </a:r>
+          </a:p>
+        </p:txBody>
+      </p:sp>
+      <p:sp>
+        <p:nvSpPr>
+          <p:cNvPr id="14" name="Rectangle 13"/>
+          <p:cNvSpPr/>
+          <p:nvPr/>
+        </p:nvSpPr>
+        <p:spPr>
+          <a:xfrm>
+            <a:off x="9774913" y="4583013"/>
+            <a:ext cx="1219424" cy="784370"/>
+          </a:xfrm>
+          <a:prstGeom prst="rect">
+            <a:avLst/>
+          </a:prstGeom>
+        </p:spPr>
+        <p:style>
+          <a:lnRef idx="2">
+            <a:schemeClr val="accent1">
+              <a:shade val="50000"/>
+            </a:schemeClr>
+          </a:lnRef>
+          <a:fillRef idx="1">
+            <a:schemeClr val="accent1"/>
+          </a:fillRef>
+          <a:effectRef idx="0">
+            <a:schemeClr val="accent1"/>
+          </a:effectRef>
+          <a:fontRef idx="minor">
+            <a:schemeClr val="lt1"/>
+          </a:fontRef>
+        </p:style>
+        <p:txBody>
+          <a:bodyPr rtlCol="0" anchor="ctr"/>
+          <a:lstStyle/>
+          <a:p>
+            <a:pPr algn="ctr"/>
+            <a:r>
+              <a:rPr lang="en-US" dirty="0"/>
+              <a:t>Rendering Engine</a:t>
+            </a:r>
+          </a:p>
+        </p:txBody>
+      </p:sp>
+      <p:sp>
+        <p:nvSpPr>
+          <p:cNvPr id="15" name="Rounded Rectangle 14"/>
+          <p:cNvSpPr/>
+          <p:nvPr/>
+        </p:nvSpPr>
+        <p:spPr>
+          <a:xfrm>
+            <a:off x="1913462" y="5227627"/>
+            <a:ext cx="2831797" cy="1479371"/>
+          </a:xfrm>
+          <a:prstGeom prst="roundRect">
+            <a:avLst/>
+          </a:prstGeom>
+          <a:noFill/>
+          <a:ln w="50800">
+            <a:solidFill>
+              <a:schemeClr val="tx1"/>
+            </a:solidFill>
+          </a:ln>
+        </p:spPr>
+        <p:style>
+          <a:lnRef idx="2">
+            <a:schemeClr val="accent1">
+              <a:shade val="50000"/>
+            </a:schemeClr>
+          </a:lnRef>
+          <a:fillRef idx="1">
+            <a:schemeClr val="accent1"/>
+          </a:fillRef>
+          <a:effectRef idx="0">
+            <a:schemeClr val="accent1"/>
+          </a:effectRef>
+          <a:fontRef idx="minor">
+            <a:schemeClr val="lt1"/>
+          </a:fontRef>
+        </p:style>
+        <p:txBody>
+          <a:bodyPr rtlCol="0" anchor="ctr"/>
+          <a:lstStyle/>
+          <a:p>
+            <a:pPr algn="ctr"/>
+            <a:r>
+              <a:rPr lang="en-US" dirty="0">
+                <a:solidFill>
+                  <a:schemeClr val="tx1"/>
+                </a:solidFill>
+              </a:rPr>
+              <a:t>Companion Computer</a:t>
+            </a:r>
+          </a:p>
+          <a:p>
+            <a:pPr algn="ctr"/>
+            <a:endParaRPr lang="en-US" dirty="0">
+              <a:solidFill>
+                <a:schemeClr val="tx1"/>
+              </a:solidFill>
+            </a:endParaRPr>
+          </a:p>
+          <a:p>
+            <a:pPr algn="ctr"/>
+            <a:r>
+              <a:rPr lang="en-US" dirty="0">
+                <a:solidFill>
+                  <a:schemeClr val="tx1"/>
+                </a:solidFill>
+              </a:rPr>
+              <a:t>(Path Planning, Mission Planning, SLAM etc.)</a:t>
+            </a:r>
+          </a:p>
+        </p:txBody>
+      </p:sp>
+      <p:pic>
+        <p:nvPicPr>
+          <p:cNvPr id="16" name="Picture 15"/>
+          <p:cNvPicPr>
+            <a:picLocks noChangeAspect="1"/>
+          </p:cNvPicPr>
+          <p:nvPr/>
+        </p:nvPicPr>
+        <p:blipFill>
+          <a:blip r:embed="rId5"/>
+          <a:stretch>
+            <a:fillRect/>
+          </a:stretch>
+        </p:blipFill>
+        <p:spPr>
+          <a:xfrm>
+            <a:off x="2207960" y="2744994"/>
+            <a:ext cx="829351" cy="1275127"/>
+          </a:xfrm>
+          <a:prstGeom prst="rect">
+            <a:avLst/>
+          </a:prstGeom>
+        </p:spPr>
+      </p:pic>
+      <p:sp>
+        <p:nvSpPr>
+          <p:cNvPr id="18" name="Rounded Rectangle 17"/>
+          <p:cNvSpPr/>
+          <p:nvPr/>
+        </p:nvSpPr>
+        <p:spPr>
+          <a:xfrm>
+            <a:off x="1833492" y="2168547"/>
+            <a:ext cx="2713838" cy="1933662"/>
+          </a:xfrm>
+          <a:prstGeom prst="roundRect">
+            <a:avLst/>
+          </a:prstGeom>
+          <a:noFill/>
+          <a:ln w="50800">
+            <a:solidFill>
+              <a:schemeClr val="tx1"/>
+            </a:solidFill>
+          </a:ln>
+        </p:spPr>
+        <p:style>
+          <a:lnRef idx="2">
+            <a:schemeClr val="accent1">
+              <a:shade val="50000"/>
+            </a:schemeClr>
+          </a:lnRef>
+          <a:fillRef idx="1">
+            <a:schemeClr val="accent1"/>
+          </a:fillRef>
+          <a:effectRef idx="0">
+            <a:schemeClr val="accent1"/>
+          </a:effectRef>
+          <a:fontRef idx="minor">
+            <a:schemeClr val="lt1"/>
+          </a:fontRef>
+        </p:style>
+        <p:txBody>
+          <a:bodyPr rtlCol="0" anchor="ctr"/>
+          <a:lstStyle/>
+          <a:p>
+            <a:pPr algn="ctr"/>
+            <a:r>
+              <a:rPr lang="en-US" dirty="0">
+                <a:solidFill>
+                  <a:schemeClr val="tx1"/>
+                </a:solidFill>
+              </a:rPr>
+              <a:t>Flight Controller Firmware</a:t>
+            </a:r>
+          </a:p>
+          <a:p>
+            <a:pPr algn="ctr"/>
+            <a:endParaRPr lang="en-US" dirty="0">
+              <a:solidFill>
+                <a:schemeClr val="tx1"/>
+              </a:solidFill>
+            </a:endParaRPr>
+          </a:p>
+          <a:p>
+            <a:pPr algn="ctr"/>
+            <a:endParaRPr lang="en-US" dirty="0">
+              <a:solidFill>
+                <a:schemeClr val="tx1"/>
+              </a:solidFill>
+            </a:endParaRPr>
+          </a:p>
+          <a:p>
+            <a:pPr algn="ctr"/>
+            <a:endParaRPr lang="en-US" dirty="0">
+              <a:solidFill>
+                <a:schemeClr val="tx1"/>
+              </a:solidFill>
+            </a:endParaRPr>
+          </a:p>
+          <a:p>
+            <a:pPr algn="ctr"/>
+            <a:endParaRPr lang="en-US" dirty="0">
+              <a:solidFill>
+                <a:schemeClr val="tx1"/>
+              </a:solidFill>
+            </a:endParaRPr>
+          </a:p>
+          <a:p>
+            <a:pPr algn="ctr"/>
+            <a:endParaRPr lang="en-US" dirty="0">
+              <a:solidFill>
+                <a:schemeClr val="tx1"/>
+              </a:solidFill>
+            </a:endParaRPr>
+          </a:p>
+        </p:txBody>
+      </p:sp>
+      <p:sp>
+        <p:nvSpPr>
+          <p:cNvPr id="26" name="Up-Down Arrow 25"/>
+          <p:cNvSpPr/>
+          <p:nvPr/>
+        </p:nvSpPr>
+        <p:spPr>
+          <a:xfrm>
+            <a:off x="2989075" y="1526795"/>
+            <a:ext cx="402671" cy="622035"/>
+          </a:xfrm>
+          <a:prstGeom prst="upDownArrow">
+            <a:avLst/>
+          </a:prstGeom>
+          <a:solidFill>
+            <a:schemeClr val="bg2">
+              <a:lumMod val="50000"/>
+            </a:schemeClr>
+          </a:solidFill>
+          <a:ln>
+            <a:noFill/>
+          </a:ln>
+        </p:spPr>
+        <p:style>
+          <a:lnRef idx="2">
+            <a:schemeClr val="accent1">
+              <a:shade val="50000"/>
+            </a:schemeClr>
+          </a:lnRef>
+          <a:fillRef idx="1">
+            <a:schemeClr val="accent1"/>
+          </a:fillRef>
+          <a:effectRef idx="0">
+            <a:schemeClr val="accent1"/>
+          </a:effectRef>
+          <a:fontRef idx="minor">
+            <a:schemeClr val="lt1"/>
+          </a:fontRef>
+        </p:style>
+        <p:txBody>
+          <a:bodyPr rtlCol="0" anchor="ctr"/>
+          <a:lstStyle/>
+          <a:p>
+            <a:pPr algn="ctr"/>
+            <a:endParaRPr lang="en-US"/>
+          </a:p>
+        </p:txBody>
+      </p:sp>
+      <p:sp>
+        <p:nvSpPr>
+          <p:cNvPr id="23" name="Cloud 22"/>
+          <p:cNvSpPr/>
+          <p:nvPr/>
+        </p:nvSpPr>
+        <p:spPr>
+          <a:xfrm>
+            <a:off x="9330734" y="916450"/>
+            <a:ext cx="1986110" cy="1047615"/>
+          </a:xfrm>
+          <a:prstGeom prst="cloud">
+            <a:avLst/>
+          </a:prstGeom>
+        </p:spPr>
+        <p:style>
+          <a:lnRef idx="2">
+            <a:schemeClr val="accent1">
+              <a:shade val="50000"/>
+            </a:schemeClr>
+          </a:lnRef>
+          <a:fillRef idx="1">
+            <a:schemeClr val="accent1"/>
+          </a:fillRef>
+          <a:effectRef idx="0">
+            <a:schemeClr val="accent1"/>
+          </a:effectRef>
+          <a:fontRef idx="minor">
+            <a:schemeClr val="lt1"/>
+          </a:fontRef>
+        </p:style>
+        <p:txBody>
+          <a:bodyPr rtlCol="0" anchor="ctr"/>
+          <a:lstStyle/>
+          <a:p>
+            <a:pPr algn="ctr"/>
+            <a:r>
+              <a:rPr lang="en-US" sz="1600" dirty="0"/>
+              <a:t>Environment Model</a:t>
+            </a:r>
+          </a:p>
+        </p:txBody>
+      </p:sp>
+      <p:sp>
+        <p:nvSpPr>
+          <p:cNvPr id="30" name="Rectangle 29">
+            <a:extLst>
+              <a:ext uri="{FF2B5EF4-FFF2-40B4-BE49-F238E27FC236}">
+                <a16:creationId xmlns:a16="http://schemas.microsoft.com/office/drawing/2014/main" id="{E087240C-F69C-467C-AAAD-E0CEB1DA3D1F}"/>
+              </a:ext>
+            </a:extLst>
+          </p:cNvPr>
+          <p:cNvSpPr/>
+          <p:nvPr/>
+        </p:nvSpPr>
+        <p:spPr>
+          <a:xfrm>
+            <a:off x="6570521" y="4668059"/>
+            <a:ext cx="1931929" cy="630541"/>
+          </a:xfrm>
+          <a:prstGeom prst="rect">
+            <a:avLst/>
+          </a:prstGeom>
+        </p:spPr>
+        <p:style>
+          <a:lnRef idx="2">
+            <a:schemeClr val="accent1">
+              <a:shade val="50000"/>
+            </a:schemeClr>
+          </a:lnRef>
+          <a:fillRef idx="1">
+            <a:schemeClr val="accent1"/>
+          </a:fillRef>
+          <a:effectRef idx="0">
+            <a:schemeClr val="accent1"/>
+          </a:effectRef>
+          <a:fontRef idx="minor">
+            <a:schemeClr val="lt1"/>
+          </a:fontRef>
+        </p:style>
+        <p:txBody>
+          <a:bodyPr rtlCol="0" anchor="ctr"/>
+          <a:lstStyle/>
+          <a:p>
+            <a:pPr algn="ctr"/>
+            <a:r>
+              <a:rPr lang="en-US" dirty="0"/>
+              <a:t>API Layer</a:t>
+            </a:r>
+          </a:p>
+        </p:txBody>
+      </p:sp>
+      <p:cxnSp>
+        <p:nvCxnSpPr>
+          <p:cNvPr id="7" name="Straight Arrow Connector 6">
+            <a:extLst>
+              <a:ext uri="{FF2B5EF4-FFF2-40B4-BE49-F238E27FC236}">
+                <a16:creationId xmlns:a16="http://schemas.microsoft.com/office/drawing/2014/main" id="{D2BF0BB1-7E03-472A-9E22-71B60F50B5DF}"/>
+              </a:ext>
+            </a:extLst>
+          </p:cNvPr>
+          <p:cNvCxnSpPr>
+            <a:cxnSpLocks/>
+            <a:stCxn id="13" idx="2"/>
+          </p:cNvCxnSpPr>
+          <p:nvPr/>
+        </p:nvCxnSpPr>
+        <p:spPr>
+          <a:xfrm>
+            <a:off x="7614920" y="1800851"/>
+            <a:ext cx="2221643" cy="1157682"/>
+          </a:xfrm>
+          <a:prstGeom prst="straightConnector1">
+            <a:avLst/>
+          </a:prstGeom>
+          <a:ln w="57150">
+            <a:solidFill>
+              <a:schemeClr val="tx1">
+                <a:lumMod val="65000"/>
+                <a:lumOff val="35000"/>
+              </a:schemeClr>
+            </a:solidFill>
+            <a:tailEnd type="triangle"/>
+          </a:ln>
+        </p:spPr>
+        <p:style>
+          <a:lnRef idx="3">
+            <a:schemeClr val="dk1"/>
+          </a:lnRef>
+          <a:fillRef idx="0">
+            <a:schemeClr val="dk1"/>
+          </a:fillRef>
+          <a:effectRef idx="2">
+            <a:schemeClr val="dk1"/>
+          </a:effectRef>
+          <a:fontRef idx="minor">
+            <a:schemeClr val="tx1"/>
+          </a:fontRef>
+        </p:style>
+      </p:cxnSp>
+      <p:cxnSp>
+        <p:nvCxnSpPr>
+          <p:cNvPr id="47" name="Straight Arrow Connector 46">
+            <a:extLst>
+              <a:ext uri="{FF2B5EF4-FFF2-40B4-BE49-F238E27FC236}">
+                <a16:creationId xmlns:a16="http://schemas.microsoft.com/office/drawing/2014/main" id="{4DBCAB21-CF6B-4C8C-9A02-789BB7C4F7D0}"/>
+              </a:ext>
+            </a:extLst>
+          </p:cNvPr>
+          <p:cNvCxnSpPr>
+            <a:cxnSpLocks/>
+            <a:stCxn id="23" idx="1"/>
+            <a:endCxn id="8" idx="0"/>
+          </p:cNvCxnSpPr>
+          <p:nvPr/>
+        </p:nvCxnSpPr>
+        <p:spPr>
+          <a:xfrm>
+            <a:off x="10323789" y="1962949"/>
+            <a:ext cx="27091" cy="995584"/>
+          </a:xfrm>
+          <a:prstGeom prst="straightConnector1">
+            <a:avLst/>
+          </a:prstGeom>
+          <a:ln w="57150">
+            <a:solidFill>
+              <a:schemeClr val="tx1">
+                <a:lumMod val="65000"/>
+                <a:lumOff val="35000"/>
+              </a:schemeClr>
+            </a:solidFill>
+            <a:tailEnd type="triangle"/>
+          </a:ln>
+        </p:spPr>
+        <p:style>
+          <a:lnRef idx="3">
+            <a:schemeClr val="dk1"/>
+          </a:lnRef>
+          <a:fillRef idx="0">
+            <a:schemeClr val="dk1"/>
+          </a:fillRef>
+          <a:effectRef idx="2">
+            <a:schemeClr val="dk1"/>
+          </a:effectRef>
+          <a:fontRef idx="minor">
+            <a:schemeClr val="tx1"/>
+          </a:fontRef>
+        </p:style>
+      </p:cxnSp>
+      <p:cxnSp>
+        <p:nvCxnSpPr>
+          <p:cNvPr id="50" name="Straight Arrow Connector 49">
+            <a:extLst>
+              <a:ext uri="{FF2B5EF4-FFF2-40B4-BE49-F238E27FC236}">
+                <a16:creationId xmlns:a16="http://schemas.microsoft.com/office/drawing/2014/main" id="{FCDFF3B6-54E1-43E3-92F7-4FC5D5C7CAA2}"/>
+              </a:ext>
+            </a:extLst>
+          </p:cNvPr>
+          <p:cNvCxnSpPr>
+            <a:cxnSpLocks/>
+            <a:stCxn id="8" idx="2"/>
+            <a:endCxn id="14" idx="0"/>
+          </p:cNvCxnSpPr>
+          <p:nvPr/>
+        </p:nvCxnSpPr>
+        <p:spPr>
+          <a:xfrm>
+            <a:off x="10350880" y="3589074"/>
+            <a:ext cx="33745" cy="993939"/>
+          </a:xfrm>
+          <a:prstGeom prst="straightConnector1">
+            <a:avLst/>
+          </a:prstGeom>
+          <a:ln w="57150">
+            <a:solidFill>
+              <a:schemeClr val="tx1">
+                <a:lumMod val="65000"/>
+                <a:lumOff val="35000"/>
+              </a:schemeClr>
+            </a:solidFill>
+            <a:tailEnd type="triangle"/>
+          </a:ln>
+        </p:spPr>
+        <p:style>
+          <a:lnRef idx="3">
+            <a:schemeClr val="dk1"/>
+          </a:lnRef>
+          <a:fillRef idx="0">
+            <a:schemeClr val="dk1"/>
+          </a:fillRef>
+          <a:effectRef idx="2">
+            <a:schemeClr val="dk1"/>
+          </a:effectRef>
+          <a:fontRef idx="minor">
+            <a:schemeClr val="tx1"/>
+          </a:fontRef>
+        </p:style>
+      </p:cxnSp>
+      <p:cxnSp>
+        <p:nvCxnSpPr>
+          <p:cNvPr id="54" name="Straight Arrow Connector 53">
+            <a:extLst>
+              <a:ext uri="{FF2B5EF4-FFF2-40B4-BE49-F238E27FC236}">
+                <a16:creationId xmlns:a16="http://schemas.microsoft.com/office/drawing/2014/main" id="{A5A7146D-A8CF-41F4-817E-E83C2E93DA99}"/>
+              </a:ext>
+            </a:extLst>
+          </p:cNvPr>
+          <p:cNvCxnSpPr>
+            <a:cxnSpLocks/>
+            <a:stCxn id="8" idx="1"/>
+            <a:endCxn id="11" idx="3"/>
+          </p:cNvCxnSpPr>
+          <p:nvPr/>
+        </p:nvCxnSpPr>
+        <p:spPr>
+          <a:xfrm flipH="1" flipV="1">
+            <a:off x="8216669" y="3261904"/>
+            <a:ext cx="1168246" cy="11900"/>
+          </a:xfrm>
+          <a:prstGeom prst="straightConnector1">
+            <a:avLst/>
+          </a:prstGeom>
+          <a:ln w="57150">
+            <a:solidFill>
+              <a:schemeClr val="tx1">
+                <a:lumMod val="65000"/>
+                <a:lumOff val="35000"/>
+              </a:schemeClr>
+            </a:solidFill>
+            <a:tailEnd type="triangle"/>
+          </a:ln>
+        </p:spPr>
+        <p:style>
+          <a:lnRef idx="3">
+            <a:schemeClr val="dk1"/>
+          </a:lnRef>
+          <a:fillRef idx="0">
+            <a:schemeClr val="dk1"/>
+          </a:fillRef>
+          <a:effectRef idx="2">
+            <a:schemeClr val="dk1"/>
+          </a:effectRef>
+          <a:fontRef idx="minor">
+            <a:schemeClr val="tx1"/>
+          </a:fontRef>
+        </p:style>
+      </p:cxnSp>
+      <p:cxnSp>
+        <p:nvCxnSpPr>
+          <p:cNvPr id="59" name="Straight Arrow Connector 58">
+            <a:extLst>
+              <a:ext uri="{FF2B5EF4-FFF2-40B4-BE49-F238E27FC236}">
+                <a16:creationId xmlns:a16="http://schemas.microsoft.com/office/drawing/2014/main" id="{D7F333FC-37F4-4813-83EC-1DC65F671F90}"/>
+              </a:ext>
+            </a:extLst>
+          </p:cNvPr>
+          <p:cNvCxnSpPr>
+            <a:cxnSpLocks/>
+            <a:endCxn id="13" idx="1"/>
+          </p:cNvCxnSpPr>
+          <p:nvPr/>
+        </p:nvCxnSpPr>
+        <p:spPr>
+          <a:xfrm flipV="1">
+            <a:off x="4559992" y="1390445"/>
+            <a:ext cx="1948640" cy="1141531"/>
+          </a:xfrm>
+          <a:prstGeom prst="straightConnector1">
+            <a:avLst/>
+          </a:prstGeom>
+          <a:ln w="57150">
+            <a:solidFill>
+              <a:schemeClr val="tx1">
+                <a:lumMod val="65000"/>
+                <a:lumOff val="35000"/>
+              </a:schemeClr>
+            </a:solidFill>
+            <a:tailEnd type="triangle"/>
+          </a:ln>
+        </p:spPr>
+        <p:style>
+          <a:lnRef idx="3">
+            <a:schemeClr val="dk1"/>
+          </a:lnRef>
+          <a:fillRef idx="0">
+            <a:schemeClr val="dk1"/>
+          </a:fillRef>
+          <a:effectRef idx="2">
+            <a:schemeClr val="dk1"/>
+          </a:effectRef>
+          <a:fontRef idx="minor">
+            <a:schemeClr val="tx1"/>
+          </a:fontRef>
+        </p:style>
+      </p:cxnSp>
+      <p:cxnSp>
+        <p:nvCxnSpPr>
+          <p:cNvPr id="62" name="Straight Arrow Connector 61">
+            <a:extLst>
+              <a:ext uri="{FF2B5EF4-FFF2-40B4-BE49-F238E27FC236}">
+                <a16:creationId xmlns:a16="http://schemas.microsoft.com/office/drawing/2014/main" id="{12837DF9-33EC-4D5D-854C-D67AED466F3E}"/>
+              </a:ext>
+            </a:extLst>
+          </p:cNvPr>
+          <p:cNvCxnSpPr>
+            <a:cxnSpLocks/>
+          </p:cNvCxnSpPr>
+          <p:nvPr/>
+        </p:nvCxnSpPr>
+        <p:spPr>
+          <a:xfrm flipH="1">
+            <a:off x="4495953" y="3221501"/>
+            <a:ext cx="2127707" cy="0"/>
+          </a:xfrm>
+          <a:prstGeom prst="straightConnector1">
+            <a:avLst/>
+          </a:prstGeom>
+          <a:ln w="57150">
+            <a:solidFill>
+              <a:schemeClr val="tx1">
+                <a:lumMod val="65000"/>
+                <a:lumOff val="35000"/>
+              </a:schemeClr>
+            </a:solidFill>
+            <a:tailEnd type="triangle"/>
+          </a:ln>
+        </p:spPr>
+        <p:style>
+          <a:lnRef idx="3">
+            <a:schemeClr val="dk1"/>
+          </a:lnRef>
+          <a:fillRef idx="0">
+            <a:schemeClr val="dk1"/>
+          </a:fillRef>
+          <a:effectRef idx="2">
+            <a:schemeClr val="dk1"/>
+          </a:effectRef>
+          <a:fontRef idx="minor">
+            <a:schemeClr val="tx1"/>
+          </a:fontRef>
+        </p:style>
+      </p:cxnSp>
+      <p:cxnSp>
+        <p:nvCxnSpPr>
+          <p:cNvPr id="69" name="Straight Arrow Connector 68">
+            <a:extLst>
+              <a:ext uri="{FF2B5EF4-FFF2-40B4-BE49-F238E27FC236}">
+                <a16:creationId xmlns:a16="http://schemas.microsoft.com/office/drawing/2014/main" id="{F1C5EE3F-61AB-4B3E-AF33-842EB036BBA1}"/>
+              </a:ext>
+            </a:extLst>
+          </p:cNvPr>
+          <p:cNvCxnSpPr>
+            <a:cxnSpLocks/>
+          </p:cNvCxnSpPr>
+          <p:nvPr/>
+        </p:nvCxnSpPr>
+        <p:spPr>
+          <a:xfrm>
+            <a:off x="4559992" y="3789720"/>
+            <a:ext cx="2044767" cy="1063634"/>
+          </a:xfrm>
+          <a:prstGeom prst="straightConnector1">
+            <a:avLst/>
+          </a:prstGeom>
+          <a:ln w="57150">
+            <a:solidFill>
+              <a:schemeClr val="tx1">
+                <a:lumMod val="65000"/>
+                <a:lumOff val="35000"/>
+              </a:schemeClr>
+            </a:solidFill>
+            <a:tailEnd type="triangle"/>
+          </a:ln>
+        </p:spPr>
+        <p:style>
+          <a:lnRef idx="3">
+            <a:schemeClr val="dk1"/>
+          </a:lnRef>
+          <a:fillRef idx="0">
+            <a:schemeClr val="dk1"/>
+          </a:fillRef>
+          <a:effectRef idx="2">
+            <a:schemeClr val="dk1"/>
+          </a:effectRef>
+          <a:fontRef idx="minor">
+            <a:schemeClr val="tx1"/>
+          </a:fontRef>
+        </p:style>
+      </p:cxnSp>
+      <p:cxnSp>
+        <p:nvCxnSpPr>
+          <p:cNvPr id="72" name="Straight Arrow Connector 71">
+            <a:extLst>
+              <a:ext uri="{FF2B5EF4-FFF2-40B4-BE49-F238E27FC236}">
+                <a16:creationId xmlns:a16="http://schemas.microsoft.com/office/drawing/2014/main" id="{EB353E2C-466B-48AF-AE76-DB597203A32A}"/>
+              </a:ext>
+            </a:extLst>
+          </p:cNvPr>
+          <p:cNvCxnSpPr>
+            <a:cxnSpLocks/>
+            <a:stCxn id="30" idx="1"/>
+          </p:cNvCxnSpPr>
+          <p:nvPr/>
+        </p:nvCxnSpPr>
+        <p:spPr>
+          <a:xfrm flipH="1" flipV="1">
+            <a:off x="4495953" y="3941216"/>
+            <a:ext cx="2074568" cy="1042114"/>
+          </a:xfrm>
+          <a:prstGeom prst="straightConnector1">
+            <a:avLst/>
+          </a:prstGeom>
+          <a:ln w="57150">
+            <a:solidFill>
+              <a:schemeClr val="tx1">
+                <a:lumMod val="65000"/>
+                <a:lumOff val="35000"/>
+              </a:schemeClr>
+            </a:solidFill>
+            <a:tailEnd type="triangle"/>
+          </a:ln>
+        </p:spPr>
+        <p:style>
+          <a:lnRef idx="3">
+            <a:schemeClr val="dk1"/>
+          </a:lnRef>
+          <a:fillRef idx="0">
+            <a:schemeClr val="dk1"/>
+          </a:fillRef>
+          <a:effectRef idx="2">
+            <a:schemeClr val="dk1"/>
+          </a:effectRef>
+          <a:fontRef idx="minor">
+            <a:schemeClr val="tx1"/>
+          </a:fontRef>
+        </p:style>
+      </p:cxnSp>
+      <p:cxnSp>
+        <p:nvCxnSpPr>
+          <p:cNvPr id="78" name="Straight Arrow Connector 77">
+            <a:extLst>
+              <a:ext uri="{FF2B5EF4-FFF2-40B4-BE49-F238E27FC236}">
+                <a16:creationId xmlns:a16="http://schemas.microsoft.com/office/drawing/2014/main" id="{407CEEAE-D4AF-4138-B18F-1A886A3407F0}"/>
+              </a:ext>
+            </a:extLst>
+          </p:cNvPr>
+          <p:cNvCxnSpPr>
+            <a:cxnSpLocks/>
+          </p:cNvCxnSpPr>
+          <p:nvPr/>
+        </p:nvCxnSpPr>
+        <p:spPr>
+          <a:xfrm flipV="1">
+            <a:off x="4745259" y="5335846"/>
+            <a:ext cx="2146510" cy="919386"/>
+          </a:xfrm>
+          <a:prstGeom prst="straightConnector1">
+            <a:avLst/>
+          </a:prstGeom>
+          <a:ln w="57150">
+            <a:solidFill>
+              <a:schemeClr val="tx1">
+                <a:lumMod val="65000"/>
+                <a:lumOff val="35000"/>
+              </a:schemeClr>
+            </a:solidFill>
+            <a:tailEnd type="triangle"/>
+          </a:ln>
+        </p:spPr>
+        <p:style>
+          <a:lnRef idx="3">
+            <a:schemeClr val="dk1"/>
+          </a:lnRef>
+          <a:fillRef idx="0">
+            <a:schemeClr val="dk1"/>
+          </a:fillRef>
+          <a:effectRef idx="2">
+            <a:schemeClr val="dk1"/>
+          </a:effectRef>
+          <a:fontRef idx="minor">
+            <a:schemeClr val="tx1"/>
+          </a:fontRef>
+        </p:style>
+      </p:cxnSp>
+      <p:cxnSp>
+        <p:nvCxnSpPr>
+          <p:cNvPr id="79" name="Straight Arrow Connector 78">
+            <a:extLst>
+              <a:ext uri="{FF2B5EF4-FFF2-40B4-BE49-F238E27FC236}">
+                <a16:creationId xmlns:a16="http://schemas.microsoft.com/office/drawing/2014/main" id="{93A0CEBE-AFED-4F58-9A7C-C2009ED23B5E}"/>
+              </a:ext>
+            </a:extLst>
+          </p:cNvPr>
+          <p:cNvCxnSpPr>
+            <a:cxnSpLocks/>
+          </p:cNvCxnSpPr>
+          <p:nvPr/>
+        </p:nvCxnSpPr>
+        <p:spPr>
+          <a:xfrm flipH="1">
+            <a:off x="4745259" y="5298600"/>
+            <a:ext cx="2559120" cy="1136598"/>
+          </a:xfrm>
+          <a:prstGeom prst="straightConnector1">
+            <a:avLst/>
+          </a:prstGeom>
+          <a:ln w="57150">
+            <a:solidFill>
+              <a:schemeClr val="tx1">
+                <a:lumMod val="65000"/>
+                <a:lumOff val="35000"/>
+              </a:schemeClr>
+            </a:solidFill>
+            <a:tailEnd type="triangle"/>
+          </a:ln>
+        </p:spPr>
+        <p:style>
+          <a:lnRef idx="3">
+            <a:schemeClr val="dk1"/>
+          </a:lnRef>
+          <a:fillRef idx="0">
+            <a:schemeClr val="dk1"/>
+          </a:fillRef>
+          <a:effectRef idx="2">
+            <a:schemeClr val="dk1"/>
+          </a:effectRef>
+          <a:fontRef idx="minor">
+            <a:schemeClr val="tx1"/>
+          </a:fontRef>
+        </p:style>
+      </p:cxnSp>
+      <p:cxnSp>
+        <p:nvCxnSpPr>
+          <p:cNvPr id="95" name="Straight Arrow Connector 94">
+            <a:extLst>
+              <a:ext uri="{FF2B5EF4-FFF2-40B4-BE49-F238E27FC236}">
+                <a16:creationId xmlns:a16="http://schemas.microsoft.com/office/drawing/2014/main" id="{4981FAEE-4EB5-4068-8532-1B31726AA5BC}"/>
+              </a:ext>
+            </a:extLst>
+          </p:cNvPr>
+          <p:cNvCxnSpPr>
+            <a:cxnSpLocks/>
+            <a:stCxn id="1028" idx="0"/>
+          </p:cNvCxnSpPr>
+          <p:nvPr/>
+        </p:nvCxnSpPr>
+        <p:spPr>
+          <a:xfrm flipV="1">
+            <a:off x="857058" y="4008233"/>
+            <a:ext cx="1108069" cy="715594"/>
+          </a:xfrm>
+          <a:prstGeom prst="straightConnector1">
+            <a:avLst/>
+          </a:prstGeom>
+          <a:ln w="57150">
+            <a:solidFill>
+              <a:schemeClr val="tx1">
+                <a:lumMod val="65000"/>
+                <a:lumOff val="35000"/>
+              </a:schemeClr>
+            </a:solidFill>
+            <a:tailEnd type="triangle"/>
+          </a:ln>
+        </p:spPr>
+        <p:style>
+          <a:lnRef idx="3">
+            <a:schemeClr val="dk1"/>
+          </a:lnRef>
+          <a:fillRef idx="0">
+            <a:schemeClr val="dk1"/>
+          </a:fillRef>
+          <a:effectRef idx="2">
+            <a:schemeClr val="dk1"/>
+          </a:effectRef>
+          <a:fontRef idx="minor">
+            <a:schemeClr val="tx1"/>
+          </a:fontRef>
+        </p:style>
+      </p:cxnSp>
+      <p:sp>
+        <p:nvSpPr>
+          <p:cNvPr id="71" name="TextBox 70">
+            <a:extLst>
+              <a:ext uri="{FF2B5EF4-FFF2-40B4-BE49-F238E27FC236}">
+                <a16:creationId xmlns:a16="http://schemas.microsoft.com/office/drawing/2014/main" id="{754DE342-849A-464F-AA97-A135DA5241C6}"/>
+              </a:ext>
+            </a:extLst>
+          </p:cNvPr>
+          <p:cNvSpPr txBox="1"/>
+          <p:nvPr/>
+        </p:nvSpPr>
+        <p:spPr>
+          <a:xfrm rot="19741477">
+            <a:off x="4606174" y="1781542"/>
+            <a:ext cx="1351460" cy="307777"/>
+          </a:xfrm>
+          <a:prstGeom prst="rect">
+            <a:avLst/>
+          </a:prstGeom>
+          <a:noFill/>
+        </p:spPr>
+        <p:txBody>
+          <a:bodyPr wrap="none" rtlCol="0">
+            <a:spAutoFit/>
+          </a:bodyPr>
+          <a:lstStyle/>
+          <a:p>
+            <a:r>
+              <a:rPr lang="en-US" sz="1400" dirty="0"/>
+              <a:t>Actuator signals</a:t>
+            </a:r>
+          </a:p>
+        </p:txBody>
+      </p:sp>
+      <p:sp>
+        <p:nvSpPr>
+          <p:cNvPr id="108" name="TextBox 107">
+            <a:extLst>
+              <a:ext uri="{FF2B5EF4-FFF2-40B4-BE49-F238E27FC236}">
+                <a16:creationId xmlns:a16="http://schemas.microsoft.com/office/drawing/2014/main" id="{B9FB6023-400D-4F6D-B86A-7ABEC5544BA3}"/>
+              </a:ext>
+            </a:extLst>
+          </p:cNvPr>
+          <p:cNvSpPr txBox="1"/>
+          <p:nvPr/>
+        </p:nvSpPr>
+        <p:spPr>
+          <a:xfrm>
+            <a:off x="4764882" y="2922492"/>
+            <a:ext cx="1779150" cy="307777"/>
+          </a:xfrm>
+          <a:prstGeom prst="rect">
+            <a:avLst/>
+          </a:prstGeom>
+          <a:noFill/>
+        </p:spPr>
+        <p:txBody>
+          <a:bodyPr wrap="square" rtlCol="0">
+            <a:spAutoFit/>
+          </a:bodyPr>
+          <a:lstStyle/>
+          <a:p>
+            <a:r>
+              <a:rPr lang="en-US" sz="1400" dirty="0"/>
+              <a:t>Sensor Data</a:t>
+            </a:r>
+          </a:p>
+        </p:txBody>
+      </p:sp>
+      <mc:AlternateContent xmlns:mc="http://schemas.openxmlformats.org/markup-compatibility/2006">
+        <mc:Choice xmlns:a14="http://schemas.microsoft.com/office/drawing/2010/main" Requires="a14">
+          <p:sp>
+            <p:nvSpPr>
+              <p:cNvPr id="109" name="TextBox 108">
+                <a:extLst>
+                  <a:ext uri="{FF2B5EF4-FFF2-40B4-BE49-F238E27FC236}">
+                    <a16:creationId xmlns:a16="http://schemas.microsoft.com/office/drawing/2014/main" id="{9759B552-D2B0-4AE7-9EC6-DBD11986F0D3}"/>
+                  </a:ext>
+                </a:extLst>
+              </p:cNvPr>
+              <p:cNvSpPr txBox="1"/>
+              <p:nvPr/>
+            </p:nvSpPr>
+            <p:spPr>
+              <a:xfrm rot="1708968">
+                <a:off x="8040024" y="2184102"/>
+                <a:ext cx="1779150" cy="307777"/>
+              </a:xfrm>
+              <a:prstGeom prst="rect">
+                <a:avLst/>
+              </a:prstGeom>
+              <a:noFill/>
+            </p:spPr>
+            <p:txBody>
+              <a:bodyPr wrap="square" rtlCol="0">
+                <a:spAutoFit/>
+              </a:bodyPr>
+              <a:lstStyle/>
+              <a:p>
+                <a14:m>
+                  <m:oMathPara xmlns:m="http://schemas.openxmlformats.org/officeDocument/2006/math">
+                    <m:oMathParaPr>
+                      <m:jc m:val="centerGroup"/>
+                    </m:oMathParaPr>
+                    <m:oMath xmlns:m="http://schemas.openxmlformats.org/officeDocument/2006/math">
+                      <m:r>
+                        <a:rPr lang="en-US" sz="1400" b="0" i="1" smtClean="0">
+                          <a:latin typeface="Cambria Math" panose="02040503050406030204" pitchFamily="18" charset="0"/>
+                        </a:rPr>
+                        <m:t>𝐹</m:t>
+                      </m:r>
+                      <m:r>
+                        <a:rPr lang="en-US" sz="1400" b="0" i="1" smtClean="0">
+                          <a:latin typeface="Cambria Math" panose="02040503050406030204" pitchFamily="18" charset="0"/>
+                        </a:rPr>
+                        <m:t>, </m:t>
+                      </m:r>
+                      <m:r>
+                        <a:rPr lang="en-US" sz="1400" b="0" i="1" smtClean="0">
+                          <a:latin typeface="Cambria Math" panose="02040503050406030204" pitchFamily="18" charset="0"/>
+                        </a:rPr>
+                        <m:t>𝜏</m:t>
+                      </m:r>
+                    </m:oMath>
+                  </m:oMathPara>
+                </a14:m>
+                <a:endParaRPr lang="en-US" sz="1400" dirty="0"/>
+              </a:p>
+            </p:txBody>
+          </p:sp>
+        </mc:Choice>
+        <mc:Fallback>
+          <p:sp>
+            <p:nvSpPr>
+              <p:cNvPr id="109" name="TextBox 108">
+                <a:extLst>
+                  <a:ext uri="{FF2B5EF4-FFF2-40B4-BE49-F238E27FC236}">
+                    <a16:creationId xmlns:a16="http://schemas.microsoft.com/office/drawing/2014/main" id="{9759B552-D2B0-4AE7-9EC6-DBD11986F0D3}"/>
+                  </a:ext>
+                </a:extLst>
+              </p:cNvPr>
+              <p:cNvSpPr txBox="1">
+                <a:spLocks noRot="1" noChangeAspect="1" noMove="1" noResize="1" noEditPoints="1" noAdjustHandles="1" noChangeArrowheads="1" noChangeShapeType="1" noTextEdit="1"/>
+              </p:cNvSpPr>
+              <p:nvPr/>
+            </p:nvSpPr>
+            <p:spPr>
+              <a:xfrm rot="1708968">
+                <a:off x="8040024" y="2184102"/>
+                <a:ext cx="1779150" cy="307777"/>
+              </a:xfrm>
+              <a:prstGeom prst="rect">
+                <a:avLst/>
+              </a:prstGeom>
+              <a:blipFill>
+                <a:blip r:embed="rId6"/>
+                <a:stretch>
+                  <a:fillRect/>
+                </a:stretch>
+              </a:blipFill>
+            </p:spPr>
+            <p:txBody>
+              <a:bodyPr/>
+              <a:lstStyle/>
+              <a:p>
+                <a:r>
+                  <a:rPr lang="en-US">
+                    <a:noFill/>
+                  </a:rPr>
+                  <a:t> </a:t>
+                </a:r>
+              </a:p>
+            </p:txBody>
+          </p:sp>
+        </mc:Fallback>
+      </mc:AlternateContent>
+      <mc:AlternateContent xmlns:mc="http://schemas.openxmlformats.org/markup-compatibility/2006">
+        <mc:Choice xmlns:a14="http://schemas.microsoft.com/office/drawing/2010/main" Requires="a14">
+          <p:sp>
+            <p:nvSpPr>
+              <p:cNvPr id="110" name="TextBox 109">
+                <a:extLst>
+                  <a:ext uri="{FF2B5EF4-FFF2-40B4-BE49-F238E27FC236}">
+                    <a16:creationId xmlns:a16="http://schemas.microsoft.com/office/drawing/2014/main" id="{1820C08B-9F8C-4E9D-AB72-D346D3C7CA14}"/>
+                  </a:ext>
+                </a:extLst>
+              </p:cNvPr>
+              <p:cNvSpPr txBox="1"/>
+              <p:nvPr/>
+            </p:nvSpPr>
+            <p:spPr>
+              <a:xfrm rot="5400000">
+                <a:off x="9305280" y="2290813"/>
+                <a:ext cx="1779150" cy="307777"/>
+              </a:xfrm>
+              <a:prstGeom prst="rect">
+                <a:avLst/>
+              </a:prstGeom>
+              <a:noFill/>
+            </p:spPr>
+            <p:txBody>
+              <a:bodyPr wrap="square" rtlCol="0">
+                <a:spAutoFit/>
+              </a:bodyPr>
+              <a:lstStyle/>
+              <a:p>
+                <a14:m>
+                  <m:oMathPara xmlns:m="http://schemas.openxmlformats.org/officeDocument/2006/math">
+                    <m:oMathParaPr>
+                      <m:jc m:val="centerGroup"/>
+                    </m:oMathParaPr>
+                    <m:oMath xmlns:m="http://schemas.openxmlformats.org/officeDocument/2006/math">
+                      <m:r>
+                        <a:rPr lang="en-US" sz="1400" b="0" i="1" smtClean="0">
+                          <a:latin typeface="Cambria Math" panose="02040503050406030204" pitchFamily="18" charset="0"/>
+                        </a:rPr>
+                        <m:t>𝐹</m:t>
+                      </m:r>
+                      <m:r>
+                        <a:rPr lang="en-US" sz="1400" b="0" i="1" smtClean="0">
+                          <a:latin typeface="Cambria Math" panose="02040503050406030204" pitchFamily="18" charset="0"/>
+                        </a:rPr>
+                        <m:t>, </m:t>
+                      </m:r>
+                      <m:r>
+                        <a:rPr lang="en-US" sz="1400" b="0" i="1" smtClean="0">
+                          <a:latin typeface="Cambria Math" panose="02040503050406030204" pitchFamily="18" charset="0"/>
+                        </a:rPr>
+                        <m:t>𝜏</m:t>
+                      </m:r>
+                      <m:r>
+                        <a:rPr lang="en-US" sz="1400" b="0" i="1" smtClean="0">
+                          <a:latin typeface="Cambria Math" panose="02040503050406030204" pitchFamily="18" charset="0"/>
+                        </a:rPr>
+                        <m:t>, </m:t>
+                      </m:r>
+                      <m:r>
+                        <a:rPr lang="en-US" sz="1400" b="0" i="1" smtClean="0">
+                          <a:latin typeface="Cambria Math" panose="02040503050406030204" pitchFamily="18" charset="0"/>
+                        </a:rPr>
+                        <m:t>𝑔</m:t>
+                      </m:r>
+                      <m:r>
+                        <a:rPr lang="en-US" sz="1400" b="0" i="1" smtClean="0">
+                          <a:latin typeface="Cambria Math" panose="02040503050406030204" pitchFamily="18" charset="0"/>
+                        </a:rPr>
+                        <m:t>, </m:t>
+                      </m:r>
+                      <m:r>
+                        <a:rPr lang="en-US" sz="1400" b="0" i="1" smtClean="0">
+                          <a:latin typeface="Cambria Math" panose="02040503050406030204" pitchFamily="18" charset="0"/>
+                        </a:rPr>
+                        <m:t>𝜌</m:t>
+                      </m:r>
+                      <m:r>
+                        <a:rPr lang="en-US" sz="1400" b="0" i="1" smtClean="0">
+                          <a:latin typeface="Cambria Math" panose="02040503050406030204" pitchFamily="18" charset="0"/>
+                        </a:rPr>
+                        <m:t>, </m:t>
+                      </m:r>
+                      <m:r>
+                        <a:rPr lang="en-US" sz="1400" b="0" i="1" smtClean="0">
+                          <a:latin typeface="Cambria Math" panose="02040503050406030204" pitchFamily="18" charset="0"/>
+                        </a:rPr>
+                        <m:t>𝑃</m:t>
+                      </m:r>
+                      <m:r>
+                        <a:rPr lang="en-US" sz="1400" b="0" i="1" smtClean="0">
+                          <a:latin typeface="Cambria Math" panose="02040503050406030204" pitchFamily="18" charset="0"/>
+                        </a:rPr>
+                        <m:t>, </m:t>
+                      </m:r>
+                      <m:r>
+                        <a:rPr lang="en-US" sz="1400" b="0" i="1" smtClean="0">
+                          <a:latin typeface="Cambria Math" panose="02040503050406030204" pitchFamily="18" charset="0"/>
+                        </a:rPr>
+                        <m:t>𝑇</m:t>
+                      </m:r>
+                    </m:oMath>
+                  </m:oMathPara>
+                </a14:m>
+                <a:endParaRPr lang="en-US" sz="1400" dirty="0"/>
+              </a:p>
+            </p:txBody>
+          </p:sp>
+        </mc:Choice>
+        <mc:Fallback>
+          <p:sp>
+            <p:nvSpPr>
+              <p:cNvPr id="110" name="TextBox 109">
+                <a:extLst>
+                  <a:ext uri="{FF2B5EF4-FFF2-40B4-BE49-F238E27FC236}">
+                    <a16:creationId xmlns:a16="http://schemas.microsoft.com/office/drawing/2014/main" id="{1820C08B-9F8C-4E9D-AB72-D346D3C7CA14}"/>
+                  </a:ext>
+                </a:extLst>
+              </p:cNvPr>
+              <p:cNvSpPr txBox="1">
+                <a:spLocks noRot="1" noChangeAspect="1" noMove="1" noResize="1" noEditPoints="1" noAdjustHandles="1" noChangeArrowheads="1" noChangeShapeType="1" noTextEdit="1"/>
+              </p:cNvSpPr>
+              <p:nvPr/>
+            </p:nvSpPr>
+            <p:spPr>
+              <a:xfrm rot="5400000">
+                <a:off x="9305280" y="2290813"/>
+                <a:ext cx="1779150" cy="307777"/>
+              </a:xfrm>
+              <a:prstGeom prst="rect">
+                <a:avLst/>
+              </a:prstGeom>
+              <a:blipFill>
+                <a:blip r:embed="rId7"/>
+                <a:stretch>
+                  <a:fillRect/>
+                </a:stretch>
+              </a:blipFill>
+            </p:spPr>
+            <p:txBody>
+              <a:bodyPr/>
+              <a:lstStyle/>
+              <a:p>
+                <a:r>
+                  <a:rPr lang="en-US">
+                    <a:noFill/>
+                  </a:rPr>
+                  <a:t> </a:t>
+                </a:r>
+              </a:p>
+            </p:txBody>
+          </p:sp>
+        </mc:Fallback>
+      </mc:AlternateContent>
+      <p:sp>
+        <p:nvSpPr>
+          <p:cNvPr id="111" name="TextBox 110">
+            <a:extLst>
+              <a:ext uri="{FF2B5EF4-FFF2-40B4-BE49-F238E27FC236}">
+                <a16:creationId xmlns:a16="http://schemas.microsoft.com/office/drawing/2014/main" id="{89E0D1F8-C1EE-4E6E-8520-77AB3508D817}"/>
+              </a:ext>
+            </a:extLst>
+          </p:cNvPr>
+          <p:cNvSpPr txBox="1"/>
+          <p:nvPr/>
+        </p:nvSpPr>
+        <p:spPr>
+          <a:xfrm>
+            <a:off x="8358389" y="2922687"/>
+            <a:ext cx="1869044" cy="307777"/>
+          </a:xfrm>
+          <a:prstGeom prst="rect">
+            <a:avLst/>
+          </a:prstGeom>
+          <a:noFill/>
+        </p:spPr>
+        <p:txBody>
+          <a:bodyPr wrap="square" rtlCol="0">
+            <a:spAutoFit/>
+          </a:bodyPr>
+          <a:lstStyle/>
+          <a:p>
+            <a:r>
+              <a:rPr lang="en-US" sz="1400" dirty="0"/>
+              <a:t>Kinematics</a:t>
+            </a:r>
+          </a:p>
+        </p:txBody>
+      </p:sp>
+      <p:sp>
+        <p:nvSpPr>
+          <p:cNvPr id="112" name="TextBox 111">
+            <a:extLst>
+              <a:ext uri="{FF2B5EF4-FFF2-40B4-BE49-F238E27FC236}">
+                <a16:creationId xmlns:a16="http://schemas.microsoft.com/office/drawing/2014/main" id="{62D1591E-0AA5-4691-9F1E-FE0BBB2D7FD6}"/>
+              </a:ext>
+            </a:extLst>
+          </p:cNvPr>
+          <p:cNvSpPr txBox="1"/>
+          <p:nvPr/>
+        </p:nvSpPr>
+        <p:spPr>
+          <a:xfrm rot="5400000">
+            <a:off x="9312116" y="3993953"/>
+            <a:ext cx="1779150" cy="307777"/>
+          </a:xfrm>
+          <a:prstGeom prst="rect">
+            <a:avLst/>
+          </a:prstGeom>
+          <a:noFill/>
+        </p:spPr>
+        <p:txBody>
+          <a:bodyPr wrap="square" rtlCol="0">
+            <a:spAutoFit/>
+          </a:bodyPr>
+          <a:lstStyle/>
+          <a:p>
+            <a:pPr algn="ctr"/>
+            <a:r>
+              <a:rPr lang="en-US" sz="1400" dirty="0"/>
+              <a:t>Pose</a:t>
+            </a:r>
+          </a:p>
+        </p:txBody>
+      </p:sp>
+      <p:sp>
+        <p:nvSpPr>
+          <p:cNvPr id="113" name="TextBox 112">
+            <a:extLst>
+              <a:ext uri="{FF2B5EF4-FFF2-40B4-BE49-F238E27FC236}">
+                <a16:creationId xmlns:a16="http://schemas.microsoft.com/office/drawing/2014/main" id="{F1A1F28C-9E35-4214-B4E6-91501BBD8C06}"/>
+              </a:ext>
+            </a:extLst>
+          </p:cNvPr>
+          <p:cNvSpPr txBox="1"/>
+          <p:nvPr/>
+        </p:nvSpPr>
+        <p:spPr>
+          <a:xfrm rot="1605130">
+            <a:off x="4518985" y="4419327"/>
+            <a:ext cx="1779150" cy="307777"/>
+          </a:xfrm>
+          <a:prstGeom prst="rect">
+            <a:avLst/>
+          </a:prstGeom>
+          <a:noFill/>
+        </p:spPr>
+        <p:txBody>
+          <a:bodyPr wrap="square" rtlCol="0">
+            <a:spAutoFit/>
+          </a:bodyPr>
+          <a:lstStyle/>
+          <a:p>
+            <a:r>
+              <a:rPr lang="en-US" sz="1400" dirty="0"/>
+              <a:t>Desired state</a:t>
+            </a:r>
+          </a:p>
+        </p:txBody>
+      </p:sp>
+      <p:sp>
+        <p:nvSpPr>
+          <p:cNvPr id="114" name="TextBox 113">
+            <a:extLst>
+              <a:ext uri="{FF2B5EF4-FFF2-40B4-BE49-F238E27FC236}">
+                <a16:creationId xmlns:a16="http://schemas.microsoft.com/office/drawing/2014/main" id="{83A96480-21DB-4A87-B9A7-A3C29894F065}"/>
+              </a:ext>
+            </a:extLst>
+          </p:cNvPr>
+          <p:cNvSpPr txBox="1"/>
+          <p:nvPr/>
+        </p:nvSpPr>
+        <p:spPr>
+          <a:xfrm rot="1605130">
+            <a:off x="4658186" y="3974081"/>
+            <a:ext cx="1779150" cy="307777"/>
+          </a:xfrm>
+          <a:prstGeom prst="rect">
+            <a:avLst/>
+          </a:prstGeom>
+          <a:noFill/>
+        </p:spPr>
+        <p:txBody>
+          <a:bodyPr wrap="square" rtlCol="0">
+            <a:spAutoFit/>
+          </a:bodyPr>
+          <a:lstStyle/>
+          <a:p>
+            <a:r>
+              <a:rPr lang="en-US" sz="1400" dirty="0"/>
+              <a:t>Estimated state</a:t>
+            </a:r>
+          </a:p>
+        </p:txBody>
+      </p:sp>
+      <p:cxnSp>
+        <p:nvCxnSpPr>
+          <p:cNvPr id="116" name="Straight Arrow Connector 115">
+            <a:extLst>
+              <a:ext uri="{FF2B5EF4-FFF2-40B4-BE49-F238E27FC236}">
+                <a16:creationId xmlns:a16="http://schemas.microsoft.com/office/drawing/2014/main" id="{73D92508-6C65-4536-B470-028B7A008513}"/>
+              </a:ext>
+            </a:extLst>
+          </p:cNvPr>
+          <p:cNvCxnSpPr>
+            <a:cxnSpLocks/>
+            <a:endCxn id="30" idx="0"/>
+          </p:cNvCxnSpPr>
+          <p:nvPr/>
+        </p:nvCxnSpPr>
+        <p:spPr>
+          <a:xfrm>
+            <a:off x="7531296" y="3569800"/>
+            <a:ext cx="5190" cy="1098259"/>
+          </a:xfrm>
+          <a:prstGeom prst="straightConnector1">
+            <a:avLst/>
+          </a:prstGeom>
+          <a:ln w="57150">
+            <a:solidFill>
+              <a:schemeClr val="tx1">
+                <a:lumMod val="65000"/>
+                <a:lumOff val="35000"/>
+              </a:schemeClr>
+            </a:solidFill>
+            <a:tailEnd type="triangle"/>
+          </a:ln>
+        </p:spPr>
+        <p:style>
+          <a:lnRef idx="3">
+            <a:schemeClr val="dk1"/>
+          </a:lnRef>
+          <a:fillRef idx="0">
+            <a:schemeClr val="dk1"/>
+          </a:fillRef>
+          <a:effectRef idx="2">
+            <a:schemeClr val="dk1"/>
+          </a:effectRef>
+          <a:fontRef idx="minor">
+            <a:schemeClr val="tx1"/>
+          </a:fontRef>
+        </p:style>
+      </p:cxnSp>
+      <p:sp>
+        <p:nvSpPr>
+          <p:cNvPr id="117" name="TextBox 116">
+            <a:extLst>
+              <a:ext uri="{FF2B5EF4-FFF2-40B4-BE49-F238E27FC236}">
+                <a16:creationId xmlns:a16="http://schemas.microsoft.com/office/drawing/2014/main" id="{8B98CD86-79B3-4103-ABD8-E4B5FA58FAE6}"/>
+              </a:ext>
+            </a:extLst>
+          </p:cNvPr>
+          <p:cNvSpPr txBox="1"/>
+          <p:nvPr/>
+        </p:nvSpPr>
+        <p:spPr>
+          <a:xfrm rot="5400000">
+            <a:off x="6492532" y="3974679"/>
+            <a:ext cx="1779150" cy="307777"/>
+          </a:xfrm>
+          <a:prstGeom prst="rect">
+            <a:avLst/>
+          </a:prstGeom>
+          <a:noFill/>
+        </p:spPr>
+        <p:txBody>
+          <a:bodyPr wrap="square" rtlCol="0">
+            <a:spAutoFit/>
+          </a:bodyPr>
+          <a:lstStyle/>
+          <a:p>
+            <a:pPr algn="ctr"/>
+            <a:r>
+              <a:rPr lang="en-US" sz="1400" dirty="0"/>
+              <a:t>Sensor Data</a:t>
+            </a:r>
+          </a:p>
+        </p:txBody>
+      </p:sp>
+      <p:sp>
+        <p:nvSpPr>
+          <p:cNvPr id="119" name="TextBox 118">
+            <a:extLst>
+              <a:ext uri="{FF2B5EF4-FFF2-40B4-BE49-F238E27FC236}">
+                <a16:creationId xmlns:a16="http://schemas.microsoft.com/office/drawing/2014/main" id="{DD3B7468-037D-4581-9EC2-6639B5AC44A0}"/>
+              </a:ext>
+            </a:extLst>
+          </p:cNvPr>
+          <p:cNvSpPr txBox="1"/>
+          <p:nvPr/>
+        </p:nvSpPr>
+        <p:spPr>
+          <a:xfrm rot="20249293">
+            <a:off x="4764882" y="5587711"/>
+            <a:ext cx="1779150" cy="307777"/>
+          </a:xfrm>
+          <a:prstGeom prst="rect">
+            <a:avLst/>
+          </a:prstGeom>
+          <a:noFill/>
+        </p:spPr>
+        <p:txBody>
+          <a:bodyPr wrap="square" rtlCol="0">
+            <a:spAutoFit/>
+          </a:bodyPr>
+          <a:lstStyle/>
+          <a:p>
+            <a:r>
+              <a:rPr lang="en-US" sz="1400" dirty="0"/>
+              <a:t>Desired state</a:t>
+            </a:r>
+          </a:p>
+        </p:txBody>
+      </p:sp>
+      <p:sp>
+        <p:nvSpPr>
+          <p:cNvPr id="120" name="TextBox 119">
+            <a:extLst>
+              <a:ext uri="{FF2B5EF4-FFF2-40B4-BE49-F238E27FC236}">
+                <a16:creationId xmlns:a16="http://schemas.microsoft.com/office/drawing/2014/main" id="{4A824190-AED8-428C-BC51-DB1161A45C82}"/>
+              </a:ext>
+            </a:extLst>
+          </p:cNvPr>
+          <p:cNvSpPr txBox="1"/>
+          <p:nvPr/>
+        </p:nvSpPr>
+        <p:spPr>
+          <a:xfrm rot="20249293">
+            <a:off x="4938668" y="5826215"/>
+            <a:ext cx="2500911" cy="523220"/>
+          </a:xfrm>
+          <a:prstGeom prst="rect">
+            <a:avLst/>
+          </a:prstGeom>
+          <a:noFill/>
+        </p:spPr>
+        <p:txBody>
+          <a:bodyPr wrap="square" rtlCol="0">
+            <a:spAutoFit/>
+          </a:bodyPr>
+          <a:lstStyle/>
+          <a:p>
+            <a:r>
+              <a:rPr lang="en-US" sz="1400" dirty="0"/>
+              <a:t>Estimated state,  Sensor and</a:t>
+            </a:r>
+          </a:p>
+          <a:p>
+            <a:r>
+              <a:rPr lang="en-US" sz="1400" dirty="0"/>
+              <a:t>Perception Data</a:t>
+            </a:r>
+          </a:p>
+        </p:txBody>
+      </p:sp>
+      <p:sp>
+        <p:nvSpPr>
+          <p:cNvPr id="121" name="TextBox 120">
+            <a:extLst>
+              <a:ext uri="{FF2B5EF4-FFF2-40B4-BE49-F238E27FC236}">
+                <a16:creationId xmlns:a16="http://schemas.microsoft.com/office/drawing/2014/main" id="{28BFACCA-C0F8-4384-A029-D5CBD74CC677}"/>
+              </a:ext>
+            </a:extLst>
+          </p:cNvPr>
+          <p:cNvSpPr txBox="1"/>
+          <p:nvPr/>
+        </p:nvSpPr>
+        <p:spPr>
+          <a:xfrm rot="19626318">
+            <a:off x="646810" y="3957908"/>
+            <a:ext cx="1779150" cy="307777"/>
+          </a:xfrm>
+          <a:prstGeom prst="rect">
+            <a:avLst/>
+          </a:prstGeom>
+          <a:noFill/>
+        </p:spPr>
+        <p:txBody>
+          <a:bodyPr wrap="square" rtlCol="0">
+            <a:spAutoFit/>
+          </a:bodyPr>
+          <a:lstStyle/>
+          <a:p>
+            <a:r>
+              <a:rPr lang="en-US" sz="1400" dirty="0"/>
+              <a:t>Desired state</a:t>
+            </a:r>
+          </a:p>
+        </p:txBody>
+      </p:sp>
+      <p:cxnSp>
+        <p:nvCxnSpPr>
+          <p:cNvPr id="128" name="Straight Arrow Connector 127">
+            <a:extLst>
+              <a:ext uri="{FF2B5EF4-FFF2-40B4-BE49-F238E27FC236}">
+                <a16:creationId xmlns:a16="http://schemas.microsoft.com/office/drawing/2014/main" id="{8650E9F7-F1B5-40E2-B3E2-CD1DA5D691CC}"/>
+              </a:ext>
+            </a:extLst>
+          </p:cNvPr>
+          <p:cNvCxnSpPr>
+            <a:cxnSpLocks/>
+          </p:cNvCxnSpPr>
+          <p:nvPr/>
+        </p:nvCxnSpPr>
+        <p:spPr>
+          <a:xfrm flipH="1" flipV="1">
+            <a:off x="8193862" y="3266689"/>
+            <a:ext cx="1168246" cy="11900"/>
+          </a:xfrm>
+          <a:prstGeom prst="straightConnector1">
+            <a:avLst/>
+          </a:prstGeom>
+          <a:ln w="57150">
+            <a:solidFill>
+              <a:schemeClr val="tx1">
+                <a:lumMod val="65000"/>
+                <a:lumOff val="35000"/>
+              </a:schemeClr>
+            </a:solidFill>
+            <a:tailEnd type="triangle"/>
+          </a:ln>
+        </p:spPr>
+        <p:style>
+          <a:lnRef idx="3">
+            <a:schemeClr val="dk1"/>
+          </a:lnRef>
+          <a:fillRef idx="0">
+            <a:schemeClr val="dk1"/>
+          </a:fillRef>
+          <a:effectRef idx="2">
+            <a:schemeClr val="dk1"/>
+          </a:effectRef>
+          <a:fontRef idx="minor">
+            <a:schemeClr val="tx1"/>
+          </a:fontRef>
+        </p:style>
+      </p:cxnSp>
+      <p:cxnSp>
+        <p:nvCxnSpPr>
+          <p:cNvPr id="130" name="Straight Arrow Connector 129">
+            <a:extLst>
+              <a:ext uri="{FF2B5EF4-FFF2-40B4-BE49-F238E27FC236}">
+                <a16:creationId xmlns:a16="http://schemas.microsoft.com/office/drawing/2014/main" id="{58687DD9-9518-43A3-B748-97AA5B6F0CA6}"/>
+              </a:ext>
+            </a:extLst>
+          </p:cNvPr>
+          <p:cNvCxnSpPr>
+            <a:cxnSpLocks/>
+            <a:stCxn id="14" idx="1"/>
+            <a:endCxn id="30" idx="3"/>
+          </p:cNvCxnSpPr>
+          <p:nvPr/>
+        </p:nvCxnSpPr>
+        <p:spPr>
+          <a:xfrm flipH="1">
+            <a:off x="8502450" y="4975198"/>
+            <a:ext cx="1272463" cy="8132"/>
+          </a:xfrm>
+          <a:prstGeom prst="straightConnector1">
+            <a:avLst/>
+          </a:prstGeom>
+          <a:ln w="57150">
+            <a:solidFill>
+              <a:schemeClr val="tx1">
+                <a:lumMod val="65000"/>
+                <a:lumOff val="35000"/>
+              </a:schemeClr>
+            </a:solidFill>
+            <a:tailEnd type="triangle"/>
+          </a:ln>
+        </p:spPr>
+        <p:style>
+          <a:lnRef idx="3">
+            <a:schemeClr val="dk1"/>
+          </a:lnRef>
+          <a:fillRef idx="0">
+            <a:schemeClr val="dk1"/>
+          </a:fillRef>
+          <a:effectRef idx="2">
+            <a:schemeClr val="dk1"/>
+          </a:effectRef>
+          <a:fontRef idx="minor">
+            <a:schemeClr val="tx1"/>
+          </a:fontRef>
+        </p:style>
+      </p:cxnSp>
+      <p:sp>
+        <p:nvSpPr>
+          <p:cNvPr id="131" name="TextBox 130">
+            <a:extLst>
+              <a:ext uri="{FF2B5EF4-FFF2-40B4-BE49-F238E27FC236}">
+                <a16:creationId xmlns:a16="http://schemas.microsoft.com/office/drawing/2014/main" id="{08C20C61-5ADC-4311-9025-F1FB9F86DDAF}"/>
+              </a:ext>
+            </a:extLst>
+          </p:cNvPr>
+          <p:cNvSpPr txBox="1"/>
+          <p:nvPr/>
+        </p:nvSpPr>
+        <p:spPr>
+          <a:xfrm>
+            <a:off x="8681113" y="5002720"/>
+            <a:ext cx="1869044" cy="523220"/>
+          </a:xfrm>
+          <a:prstGeom prst="rect">
+            <a:avLst/>
+          </a:prstGeom>
+          <a:noFill/>
+        </p:spPr>
+        <p:txBody>
+          <a:bodyPr wrap="square" rtlCol="0">
+            <a:spAutoFit/>
+          </a:bodyPr>
+          <a:lstStyle/>
+          <a:p>
+            <a:r>
+              <a:rPr lang="en-US" sz="1400" dirty="0"/>
+              <a:t>Perception</a:t>
+            </a:r>
+          </a:p>
+          <a:p>
+            <a:r>
+              <a:rPr lang="en-US" sz="1400" dirty="0"/>
+              <a:t>Data</a:t>
+            </a:r>
+          </a:p>
+        </p:txBody>
+      </p:sp>
+    </p:spTree>
+    <p:extLst>
+      <p:ext uri="{BB962C8B-B14F-4D97-AF65-F5344CB8AC3E}">
+        <p14:creationId xmlns:p14="http://schemas.microsoft.com/office/powerpoint/2010/main" val="1221872496"/>
+      </p:ext>
+    </p:extLst>
+  </p:cSld>
+  <p:clrMapOvr>
+    <a:masterClrMapping/>
+  </p:clrMapOvr>
+</p:sld>
+</file>
+
+<file path=ppt/slides/slide3.xml><?xml version="1.0" encoding="utf-8"?>
 <p:sld xmlns:a="http://schemas.openxmlformats.org/drawingml/2006/main" xmlns:r="http://schemas.openxmlformats.org/officeDocument/2006/relationships" xmlns:p="http://schemas.openxmlformats.org/presentationml/2006/main">
   <p:cSld>
     <p:spTree>
@@ -5067,8 +7260,8 @@
             </a:fontRef>
           </p:style>
         </p:cxnSp>
-        <mc:AlternateContent xmlns:mc="http://schemas.openxmlformats.org/markup-compatibility/2006">
-          <mc:Choice xmlns:a14="http://schemas.microsoft.com/office/drawing/2010/main" Requires="a14">
+        <mc:AlternateContent xmlns:mc="http://schemas.openxmlformats.org/markup-compatibility/2006" xmlns:a14="http://schemas.microsoft.com/office/drawing/2010/main">
+          <mc:Choice Requires="a14">
             <p:sp>
               <p:nvSpPr>
                 <p:cNvPr id="26" name="TextBox 25"/>
@@ -5091,6 +7284,7 @@
                 </a:bodyPr>
                 <a:lstStyle/>
                 <a:p>
+                  <a:pPr/>
                   <a14:m>
                     <m:oMathPara xmlns:m="http://schemas.openxmlformats.org/officeDocument/2006/math">
                       <m:oMathParaPr>
@@ -5130,7 +7324,7 @@
               </p:txBody>
             </p:sp>
           </mc:Choice>
-          <mc:Fallback>
+          <mc:Fallback xmlns="">
             <p:sp>
               <p:nvSpPr>
                 <p:cNvPr id="26" name="TextBox 25"/>
@@ -5169,8 +7363,8 @@
             </p:sp>
           </mc:Fallback>
         </mc:AlternateContent>
-        <mc:AlternateContent xmlns:mc="http://schemas.openxmlformats.org/markup-compatibility/2006">
-          <mc:Choice xmlns:a14="http://schemas.microsoft.com/office/drawing/2010/main" Requires="a14">
+        <mc:AlternateContent xmlns:mc="http://schemas.openxmlformats.org/markup-compatibility/2006" xmlns:a14="http://schemas.microsoft.com/office/drawing/2010/main">
+          <mc:Choice Requires="a14">
             <p:sp>
               <p:nvSpPr>
                 <p:cNvPr id="27" name="TextBox 26"/>
@@ -5193,6 +7387,7 @@
                 </a:bodyPr>
                 <a:lstStyle/>
                 <a:p>
+                  <a:pPr/>
                   <a14:m>
                     <m:oMathPara xmlns:m="http://schemas.openxmlformats.org/officeDocument/2006/math">
                       <m:oMathParaPr>
@@ -5232,7 +7427,7 @@
               </p:txBody>
             </p:sp>
           </mc:Choice>
-          <mc:Fallback>
+          <mc:Fallback xmlns="">
             <p:sp>
               <p:nvSpPr>
                 <p:cNvPr id="27" name="TextBox 26"/>
@@ -5271,8 +7466,8 @@
             </p:sp>
           </mc:Fallback>
         </mc:AlternateContent>
-        <mc:AlternateContent xmlns:mc="http://schemas.openxmlformats.org/markup-compatibility/2006">
-          <mc:Choice xmlns:a14="http://schemas.microsoft.com/office/drawing/2010/main" Requires="a14">
+        <mc:AlternateContent xmlns:mc="http://schemas.openxmlformats.org/markup-compatibility/2006" xmlns:a14="http://schemas.microsoft.com/office/drawing/2010/main">
+          <mc:Choice Requires="a14">
             <p:sp>
               <p:nvSpPr>
                 <p:cNvPr id="28" name="TextBox 27"/>
@@ -5295,6 +7490,7 @@
                 </a:bodyPr>
                 <a:lstStyle/>
                 <a:p>
+                  <a:pPr/>
                   <a14:m>
                     <m:oMathPara xmlns:m="http://schemas.openxmlformats.org/officeDocument/2006/math">
                       <m:oMathParaPr>
@@ -5334,7 +7530,7 @@
               </p:txBody>
             </p:sp>
           </mc:Choice>
-          <mc:Fallback>
+          <mc:Fallback xmlns="">
             <p:sp>
               <p:nvSpPr>
                 <p:cNvPr id="28" name="TextBox 27"/>
@@ -5373,8 +7569,8 @@
             </p:sp>
           </mc:Fallback>
         </mc:AlternateContent>
-        <mc:AlternateContent xmlns:mc="http://schemas.openxmlformats.org/markup-compatibility/2006">
-          <mc:Choice xmlns:a14="http://schemas.microsoft.com/office/drawing/2010/main" Requires="a14">
+        <mc:AlternateContent xmlns:mc="http://schemas.openxmlformats.org/markup-compatibility/2006" xmlns:a14="http://schemas.microsoft.com/office/drawing/2010/main">
+          <mc:Choice Requires="a14">
             <p:sp>
               <p:nvSpPr>
                 <p:cNvPr id="29" name="TextBox 28"/>
@@ -5397,6 +7593,7 @@
                 </a:bodyPr>
                 <a:lstStyle/>
                 <a:p>
+                  <a:pPr/>
                   <a14:m>
                     <m:oMathPara xmlns:m="http://schemas.openxmlformats.org/officeDocument/2006/math">
                       <m:oMathParaPr>
@@ -5436,7 +7633,7 @@
               </p:txBody>
             </p:sp>
           </mc:Choice>
-          <mc:Fallback>
+          <mc:Fallback xmlns="">
             <p:sp>
               <p:nvSpPr>
                 <p:cNvPr id="29" name="TextBox 28"/>
@@ -5691,8 +7888,8 @@
             </a:p>
           </p:txBody>
         </p:sp>
-        <mc:AlternateContent xmlns:mc="http://schemas.openxmlformats.org/markup-compatibility/2006">
-          <mc:Choice xmlns:a14="http://schemas.microsoft.com/office/drawing/2010/main" Requires="a14">
+        <mc:AlternateContent xmlns:mc="http://schemas.openxmlformats.org/markup-compatibility/2006" xmlns:a14="http://schemas.microsoft.com/office/drawing/2010/main">
+          <mc:Choice Requires="a14">
             <p:sp>
               <p:nvSpPr>
                 <p:cNvPr id="41" name="TextBox 40"/>
@@ -5715,6 +7912,7 @@
                 </a:bodyPr>
                 <a:lstStyle/>
                 <a:p>
+                  <a:pPr/>
                   <a14:m>
                     <m:oMathPara xmlns:m="http://schemas.openxmlformats.org/officeDocument/2006/math">
                       <m:oMathParaPr>
@@ -5754,7 +7952,7 @@
               </p:txBody>
             </p:sp>
           </mc:Choice>
-          <mc:Fallback>
+          <mc:Fallback xmlns="">
             <p:sp>
               <p:nvSpPr>
                 <p:cNvPr id="41" name="TextBox 40"/>
@@ -5793,8 +7991,8 @@
             </p:sp>
           </mc:Fallback>
         </mc:AlternateContent>
-        <mc:AlternateContent xmlns:mc="http://schemas.openxmlformats.org/markup-compatibility/2006">
-          <mc:Choice xmlns:a14="http://schemas.microsoft.com/office/drawing/2010/main" Requires="a14">
+        <mc:AlternateContent xmlns:mc="http://schemas.openxmlformats.org/markup-compatibility/2006" xmlns:a14="http://schemas.microsoft.com/office/drawing/2010/main">
+          <mc:Choice Requires="a14">
             <p:sp>
               <p:nvSpPr>
                 <p:cNvPr id="42" name="TextBox 41"/>
@@ -5817,6 +8015,7 @@
                 </a:bodyPr>
                 <a:lstStyle/>
                 <a:p>
+                  <a:pPr/>
                   <a14:m>
                     <m:oMathPara xmlns:m="http://schemas.openxmlformats.org/officeDocument/2006/math">
                       <m:oMathParaPr>
@@ -5856,7 +8055,7 @@
               </p:txBody>
             </p:sp>
           </mc:Choice>
-          <mc:Fallback>
+          <mc:Fallback xmlns="">
             <p:sp>
               <p:nvSpPr>
                 <p:cNvPr id="42" name="TextBox 41"/>
@@ -5895,8 +8094,8 @@
             </p:sp>
           </mc:Fallback>
         </mc:AlternateContent>
-        <mc:AlternateContent xmlns:mc="http://schemas.openxmlformats.org/markup-compatibility/2006">
-          <mc:Choice xmlns:a14="http://schemas.microsoft.com/office/drawing/2010/main" Requires="a14">
+        <mc:AlternateContent xmlns:mc="http://schemas.openxmlformats.org/markup-compatibility/2006" xmlns:a14="http://schemas.microsoft.com/office/drawing/2010/main">
+          <mc:Choice Requires="a14">
             <p:sp>
               <p:nvSpPr>
                 <p:cNvPr id="43" name="TextBox 42"/>
@@ -5919,6 +8118,7 @@
                 </a:bodyPr>
                 <a:lstStyle/>
                 <a:p>
+                  <a:pPr/>
                   <a14:m>
                     <m:oMathPara xmlns:m="http://schemas.openxmlformats.org/officeDocument/2006/math">
                       <m:oMathParaPr>
@@ -5958,7 +8158,7 @@
               </p:txBody>
             </p:sp>
           </mc:Choice>
-          <mc:Fallback>
+          <mc:Fallback xmlns="">
             <p:sp>
               <p:nvSpPr>
                 <p:cNvPr id="43" name="TextBox 42"/>
@@ -5997,8 +8197,8 @@
             </p:sp>
           </mc:Fallback>
         </mc:AlternateContent>
-        <mc:AlternateContent xmlns:mc="http://schemas.openxmlformats.org/markup-compatibility/2006">
-          <mc:Choice xmlns:a14="http://schemas.microsoft.com/office/drawing/2010/main" Requires="a14">
+        <mc:AlternateContent xmlns:mc="http://schemas.openxmlformats.org/markup-compatibility/2006" xmlns:a14="http://schemas.microsoft.com/office/drawing/2010/main">
+          <mc:Choice Requires="a14">
             <p:sp>
               <p:nvSpPr>
                 <p:cNvPr id="44" name="TextBox 43"/>
@@ -6021,6 +8221,7 @@
                 </a:bodyPr>
                 <a:lstStyle/>
                 <a:p>
+                  <a:pPr/>
                   <a14:m>
                     <m:oMathPara xmlns:m="http://schemas.openxmlformats.org/officeDocument/2006/math">
                       <m:oMathParaPr>
@@ -6060,7 +8261,7 @@
               </p:txBody>
             </p:sp>
           </mc:Choice>
-          <mc:Fallback>
+          <mc:Fallback xmlns="">
             <p:sp>
               <p:nvSpPr>
                 <p:cNvPr id="44" name="TextBox 43"/>
@@ -6439,8 +8640,8 @@
             </a:fontRef>
           </p:style>
         </p:cxnSp>
-        <mc:AlternateContent xmlns:mc="http://schemas.openxmlformats.org/markup-compatibility/2006">
-          <mc:Choice xmlns:a14="http://schemas.microsoft.com/office/drawing/2010/main" Requires="a14">
+        <mc:AlternateContent xmlns:mc="http://schemas.openxmlformats.org/markup-compatibility/2006" xmlns:a14="http://schemas.microsoft.com/office/drawing/2010/main">
+          <mc:Choice Requires="a14">
             <p:sp>
               <p:nvSpPr>
                 <p:cNvPr id="76" name="TextBox 75"/>
@@ -6463,6 +8664,7 @@
                 </a:bodyPr>
                 <a:lstStyle/>
                 <a:p>
+                  <a:pPr/>
                   <a14:m>
                     <m:oMathPara xmlns:m="http://schemas.openxmlformats.org/officeDocument/2006/math">
                       <m:oMathParaPr>
@@ -6503,7 +8705,7 @@
               </p:txBody>
             </p:sp>
           </mc:Choice>
-          <mc:Fallback>
+          <mc:Fallback xmlns="">
             <p:sp>
               <p:nvSpPr>
                 <p:cNvPr id="76" name="TextBox 75"/>
@@ -6542,8 +8744,8 @@
             </p:sp>
           </mc:Fallback>
         </mc:AlternateContent>
-        <mc:AlternateContent xmlns:mc="http://schemas.openxmlformats.org/markup-compatibility/2006">
-          <mc:Choice xmlns:a14="http://schemas.microsoft.com/office/drawing/2010/main" Requires="a14">
+        <mc:AlternateContent xmlns:mc="http://schemas.openxmlformats.org/markup-compatibility/2006" xmlns:a14="http://schemas.microsoft.com/office/drawing/2010/main">
+          <mc:Choice Requires="a14">
             <p:sp>
               <p:nvSpPr>
                 <p:cNvPr id="77" name="TextBox 76"/>
@@ -6566,6 +8768,7 @@
                 </a:bodyPr>
                 <a:lstStyle/>
                 <a:p>
+                  <a:pPr/>
                   <a14:m>
                     <m:oMathPara xmlns:m="http://schemas.openxmlformats.org/officeDocument/2006/math">
                       <m:oMathParaPr>
@@ -6606,7 +8809,7 @@
               </p:txBody>
             </p:sp>
           </mc:Choice>
-          <mc:Fallback>
+          <mc:Fallback xmlns="">
             <p:sp>
               <p:nvSpPr>
                 <p:cNvPr id="77" name="TextBox 76"/>
@@ -6645,8 +8848,8 @@
             </p:sp>
           </mc:Fallback>
         </mc:AlternateContent>
-        <mc:AlternateContent xmlns:mc="http://schemas.openxmlformats.org/markup-compatibility/2006">
-          <mc:Choice xmlns:a14="http://schemas.microsoft.com/office/drawing/2010/main" Requires="a14">
+        <mc:AlternateContent xmlns:mc="http://schemas.openxmlformats.org/markup-compatibility/2006" xmlns:a14="http://schemas.microsoft.com/office/drawing/2010/main">
+          <mc:Choice Requires="a14">
             <p:sp>
               <p:nvSpPr>
                 <p:cNvPr id="78" name="TextBox 77"/>
@@ -6669,6 +8872,7 @@
                 </a:bodyPr>
                 <a:lstStyle/>
                 <a:p>
+                  <a:pPr/>
                   <a14:m>
                     <m:oMathPara xmlns:m="http://schemas.openxmlformats.org/officeDocument/2006/math">
                       <m:oMathParaPr>
@@ -6709,7 +8913,7 @@
               </p:txBody>
             </p:sp>
           </mc:Choice>
-          <mc:Fallback>
+          <mc:Fallback xmlns="">
             <p:sp>
               <p:nvSpPr>
                 <p:cNvPr id="78" name="TextBox 77"/>
@@ -6748,8 +8952,8 @@
             </p:sp>
           </mc:Fallback>
         </mc:AlternateContent>
-        <mc:AlternateContent xmlns:mc="http://schemas.openxmlformats.org/markup-compatibility/2006">
-          <mc:Choice xmlns:a14="http://schemas.microsoft.com/office/drawing/2010/main" Requires="a14">
+        <mc:AlternateContent xmlns:mc="http://schemas.openxmlformats.org/markup-compatibility/2006" xmlns:a14="http://schemas.microsoft.com/office/drawing/2010/main">
+          <mc:Choice Requires="a14">
             <p:sp>
               <p:nvSpPr>
                 <p:cNvPr id="79" name="TextBox 78"/>
@@ -6772,6 +8976,7 @@
                 </a:bodyPr>
                 <a:lstStyle/>
                 <a:p>
+                  <a:pPr/>
                   <a14:m>
                     <m:oMathPara xmlns:m="http://schemas.openxmlformats.org/officeDocument/2006/math">
                       <m:oMathParaPr>
@@ -6812,7 +9017,7 @@
               </p:txBody>
             </p:sp>
           </mc:Choice>
-          <mc:Fallback>
+          <mc:Fallback xmlns="">
             <p:sp>
               <p:nvSpPr>
                 <p:cNvPr id="79" name="TextBox 78"/>

</xml_diff>